<commit_message>
Narrative and text updates and FHIR-45055 - Add a GFE Coordination Workflow to the IG
</commit_message>
<xml_diff>
--- a/input/images/AEOB_Bundle.pptx
+++ b/input/images/AEOB_Bundle.pptx
@@ -197,7 +197,7 @@
           <a:p>
             <a:fld id="{A2C95764-E0FA-0A43-A86C-F3BAB03EE38B}" type="datetimeFigureOut">
               <a:rPr lang="en-US" smtClean="0"/>
-              <a:t>12/13/2022</a:t>
+              <a:t>3/26/2024</a:t>
             </a:fld>
             <a:endParaRPr lang="en-US"/>
           </a:p>
@@ -695,7 +695,7 @@
           <a:p>
             <a:fld id="{18271F4C-9DA1-544F-94AC-914D946BC5DE}" type="datetimeFigureOut">
               <a:rPr lang="en-US" smtClean="0"/>
-              <a:t>12/13/2022</a:t>
+              <a:t>3/26/2024</a:t>
             </a:fld>
             <a:endParaRPr lang="en-US"/>
           </a:p>
@@ -893,7 +893,7 @@
           <a:p>
             <a:fld id="{18271F4C-9DA1-544F-94AC-914D946BC5DE}" type="datetimeFigureOut">
               <a:rPr lang="en-US" smtClean="0"/>
-              <a:t>12/13/2022</a:t>
+              <a:t>3/26/2024</a:t>
             </a:fld>
             <a:endParaRPr lang="en-US"/>
           </a:p>
@@ -1101,7 +1101,7 @@
           <a:p>
             <a:fld id="{18271F4C-9DA1-544F-94AC-914D946BC5DE}" type="datetimeFigureOut">
               <a:rPr lang="en-US" smtClean="0"/>
-              <a:t>12/13/2022</a:t>
+              <a:t>3/26/2024</a:t>
             </a:fld>
             <a:endParaRPr lang="en-US"/>
           </a:p>
@@ -1299,7 +1299,7 @@
           <a:p>
             <a:fld id="{18271F4C-9DA1-544F-94AC-914D946BC5DE}" type="datetimeFigureOut">
               <a:rPr lang="en-US" smtClean="0"/>
-              <a:t>12/13/2022</a:t>
+              <a:t>3/26/2024</a:t>
             </a:fld>
             <a:endParaRPr lang="en-US"/>
           </a:p>
@@ -1574,7 +1574,7 @@
           <a:p>
             <a:fld id="{18271F4C-9DA1-544F-94AC-914D946BC5DE}" type="datetimeFigureOut">
               <a:rPr lang="en-US" smtClean="0"/>
-              <a:t>12/13/2022</a:t>
+              <a:t>3/26/2024</a:t>
             </a:fld>
             <a:endParaRPr lang="en-US"/>
           </a:p>
@@ -1839,7 +1839,7 @@
           <a:p>
             <a:fld id="{18271F4C-9DA1-544F-94AC-914D946BC5DE}" type="datetimeFigureOut">
               <a:rPr lang="en-US" smtClean="0"/>
-              <a:t>12/13/2022</a:t>
+              <a:t>3/26/2024</a:t>
             </a:fld>
             <a:endParaRPr lang="en-US"/>
           </a:p>
@@ -2251,7 +2251,7 @@
           <a:p>
             <a:fld id="{18271F4C-9DA1-544F-94AC-914D946BC5DE}" type="datetimeFigureOut">
               <a:rPr lang="en-US" smtClean="0"/>
-              <a:t>12/13/2022</a:t>
+              <a:t>3/26/2024</a:t>
             </a:fld>
             <a:endParaRPr lang="en-US"/>
           </a:p>
@@ -2392,7 +2392,7 @@
           <a:p>
             <a:fld id="{18271F4C-9DA1-544F-94AC-914D946BC5DE}" type="datetimeFigureOut">
               <a:rPr lang="en-US" smtClean="0"/>
-              <a:t>12/13/2022</a:t>
+              <a:t>3/26/2024</a:t>
             </a:fld>
             <a:endParaRPr lang="en-US"/>
           </a:p>
@@ -2505,7 +2505,7 @@
           <a:p>
             <a:fld id="{18271F4C-9DA1-544F-94AC-914D946BC5DE}" type="datetimeFigureOut">
               <a:rPr lang="en-US" smtClean="0"/>
-              <a:t>12/13/2022</a:t>
+              <a:t>3/26/2024</a:t>
             </a:fld>
             <a:endParaRPr lang="en-US"/>
           </a:p>
@@ -2816,7 +2816,7 @@
           <a:p>
             <a:fld id="{18271F4C-9DA1-544F-94AC-914D946BC5DE}" type="datetimeFigureOut">
               <a:rPr lang="en-US" smtClean="0"/>
-              <a:t>12/13/2022</a:t>
+              <a:t>3/26/2024</a:t>
             </a:fld>
             <a:endParaRPr lang="en-US"/>
           </a:p>
@@ -3104,7 +3104,7 @@
           <a:p>
             <a:fld id="{18271F4C-9DA1-544F-94AC-914D946BC5DE}" type="datetimeFigureOut">
               <a:rPr lang="en-US" smtClean="0"/>
-              <a:t>12/13/2022</a:t>
+              <a:t>3/26/2024</a:t>
             </a:fld>
             <a:endParaRPr lang="en-US"/>
           </a:p>
@@ -3345,7 +3345,7 @@
           <a:p>
             <a:fld id="{18271F4C-9DA1-544F-94AC-914D946BC5DE}" type="datetimeFigureOut">
               <a:rPr lang="en-US" smtClean="0"/>
-              <a:t>12/13/2022</a:t>
+              <a:t>3/26/2024</a:t>
             </a:fld>
             <a:endParaRPr lang="en-US"/>
           </a:p>
@@ -7195,6 +7195,3379 @@
           </p:sp>
         </p:grpSp>
       </p:grpSp>
+      <p:grpSp>
+        <p:nvGrpSpPr>
+          <p:cNvPr id="43" name="Group 42">
+            <a:extLst>
+              <a:ext uri="{FF2B5EF4-FFF2-40B4-BE49-F238E27FC236}">
+                <a16:creationId xmlns:a16="http://schemas.microsoft.com/office/drawing/2014/main" id="{E6258C42-E67A-617F-2E96-041275D92FDA}"/>
+              </a:ext>
+            </a:extLst>
+          </p:cNvPr>
+          <p:cNvGrpSpPr/>
+          <p:nvPr/>
+        </p:nvGrpSpPr>
+        <p:grpSpPr>
+          <a:xfrm>
+            <a:off x="5149840" y="1424176"/>
+            <a:ext cx="4220921" cy="3264495"/>
+            <a:chOff x="244754" y="1189789"/>
+            <a:chExt cx="4220921" cy="3264495"/>
+          </a:xfrm>
+        </p:grpSpPr>
+        <p:sp>
+          <p:nvSpPr>
+            <p:cNvPr id="44" name="Alternate Process 3">
+              <a:extLst>
+                <a:ext uri="{FF2B5EF4-FFF2-40B4-BE49-F238E27FC236}">
+                  <a16:creationId xmlns:a16="http://schemas.microsoft.com/office/drawing/2014/main" id="{6A23B1F6-A057-C050-6855-01EE28FED3F0}"/>
+                </a:ext>
+              </a:extLst>
+            </p:cNvPr>
+            <p:cNvSpPr/>
+            <p:nvPr/>
+          </p:nvSpPr>
+          <p:spPr>
+            <a:xfrm>
+              <a:off x="244754" y="1189789"/>
+              <a:ext cx="4220921" cy="3264495"/>
+            </a:xfrm>
+            <a:prstGeom prst="roundRect">
+              <a:avLst>
+                <a:gd name="adj" fmla="val 5164"/>
+              </a:avLst>
+            </a:prstGeom>
+            <a:gradFill rotWithShape="1">
+              <a:gsLst>
+                <a:gs pos="0">
+                  <a:srgbClr val="DFD5A9">
+                    <a:satMod val="103000"/>
+                    <a:lumMod val="102000"/>
+                    <a:tint val="94000"/>
+                  </a:srgbClr>
+                </a:gs>
+                <a:gs pos="50000">
+                  <a:srgbClr val="DFD5A9">
+                    <a:satMod val="110000"/>
+                    <a:lumMod val="100000"/>
+                    <a:shade val="100000"/>
+                  </a:srgbClr>
+                </a:gs>
+                <a:gs pos="100000">
+                  <a:srgbClr val="DFD5A9">
+                    <a:lumMod val="99000"/>
+                    <a:satMod val="120000"/>
+                    <a:shade val="78000"/>
+                  </a:srgbClr>
+                </a:gs>
+              </a:gsLst>
+              <a:lin ang="5400000" scaled="0"/>
+            </a:gradFill>
+            <a:ln w="28575" cap="flat" cmpd="sng" algn="ctr">
+              <a:solidFill>
+                <a:srgbClr val="DFD5A9">
+                  <a:lumMod val="75000"/>
+                </a:srgbClr>
+              </a:solidFill>
+              <a:prstDash val="solid"/>
+              <a:miter lim="800000"/>
+            </a:ln>
+            <a:effectLst/>
+          </p:spPr>
+          <p:txBody>
+            <a:bodyPr rtlCol="0" anchor="t" anchorCtr="0"/>
+            <a:lstStyle/>
+            <a:p>
+              <a:pPr marL="0" marR="0" lvl="0" indent="0" algn="ctr" defTabSz="685748" eaLnBrk="1" fontAlgn="auto" latinLnBrk="0" hangingPunct="1">
+                <a:lnSpc>
+                  <a:spcPct val="100000"/>
+                </a:lnSpc>
+                <a:spcBef>
+                  <a:spcPts val="0"/>
+                </a:spcBef>
+                <a:spcAft>
+                  <a:spcPts val="0"/>
+                </a:spcAft>
+                <a:buClrTx/>
+                <a:buSzTx/>
+                <a:buFontTx/>
+                <a:buNone/>
+                <a:tabLst/>
+                <a:defRPr/>
+              </a:pPr>
+              <a:r>
+                <a:rPr kumimoji="0" lang="en-US" sz="1350" b="0" i="0" u="none" strike="noStrike" kern="0" cap="none" spc="0" normalizeH="0" baseline="0" noProof="0" dirty="0">
+                  <a:ln>
+                    <a:noFill/>
+                  </a:ln>
+                  <a:solidFill>
+                    <a:srgbClr val="474749">
+                      <a:lumMod val="50000"/>
+                    </a:srgbClr>
+                  </a:solidFill>
+                  <a:effectLst/>
+                  <a:uLnTx/>
+                  <a:uFillTx/>
+                  <a:latin typeface="Arial" panose="020B0604020202020204"/>
+                  <a:ea typeface="+mn-ea"/>
+                  <a:cs typeface="+mn-cs"/>
+                </a:rPr>
+                <a:t>AEOB Bundle</a:t>
+              </a:r>
+            </a:p>
+          </p:txBody>
+        </p:sp>
+        <p:sp>
+          <p:nvSpPr>
+            <p:cNvPr id="45" name="Alternate Process 23">
+              <a:extLst>
+                <a:ext uri="{FF2B5EF4-FFF2-40B4-BE49-F238E27FC236}">
+                  <a16:creationId xmlns:a16="http://schemas.microsoft.com/office/drawing/2014/main" id="{3C1A9B70-FCE1-941D-00BB-E6990B4514F6}"/>
+                </a:ext>
+              </a:extLst>
+            </p:cNvPr>
+            <p:cNvSpPr/>
+            <p:nvPr/>
+          </p:nvSpPr>
+          <p:spPr>
+            <a:xfrm>
+              <a:off x="425231" y="1632373"/>
+              <a:ext cx="1146386" cy="418338"/>
+            </a:xfrm>
+            <a:prstGeom prst="flowChartAlternateProcess">
+              <a:avLst/>
+            </a:prstGeom>
+            <a:solidFill>
+              <a:srgbClr val="51657F">
+                <a:lumMod val="60000"/>
+                <a:lumOff val="40000"/>
+              </a:srgbClr>
+            </a:solidFill>
+            <a:ln w="25400" cap="flat" cmpd="sng" algn="ctr">
+              <a:solidFill>
+                <a:srgbClr val="2A323A">
+                  <a:lumMod val="75000"/>
+                  <a:lumOff val="25000"/>
+                </a:srgbClr>
+              </a:solidFill>
+              <a:prstDash val="solid"/>
+              <a:miter lim="800000"/>
+            </a:ln>
+            <a:effectLst/>
+          </p:spPr>
+          <p:txBody>
+            <a:bodyPr lIns="0" rIns="0" rtlCol="0" anchor="ctr"/>
+            <a:lstStyle/>
+            <a:p>
+              <a:pPr marL="0" marR="0" lvl="0" indent="0" algn="ctr" defTabSz="685748" eaLnBrk="1" fontAlgn="auto" latinLnBrk="0" hangingPunct="1">
+                <a:lnSpc>
+                  <a:spcPct val="100000"/>
+                </a:lnSpc>
+                <a:spcBef>
+                  <a:spcPts val="0"/>
+                </a:spcBef>
+                <a:spcAft>
+                  <a:spcPts val="0"/>
+                </a:spcAft>
+                <a:buClrTx/>
+                <a:buSzTx/>
+                <a:buFontTx/>
+                <a:buNone/>
+                <a:tabLst/>
+                <a:defRPr/>
+              </a:pPr>
+              <a:r>
+                <a:rPr kumimoji="0" lang="en-US" sz="1050" b="1" i="0" u="none" strike="noStrike" kern="0" cap="none" spc="0" normalizeH="0" baseline="0" noProof="0" dirty="0" err="1">
+                  <a:ln>
+                    <a:noFill/>
+                  </a:ln>
+                  <a:solidFill>
+                    <a:prstClr val="white"/>
+                  </a:solidFill>
+                  <a:effectLst/>
+                  <a:uLnTx/>
+                  <a:uFillTx/>
+                  <a:latin typeface="Arial" panose="020B0604020202020204"/>
+                </a:rPr>
+                <a:t>HRex</a:t>
+              </a:r>
+              <a:r>
+                <a:rPr kumimoji="0" lang="en-US" sz="1050" b="1" i="0" u="none" strike="noStrike" kern="0" cap="none" spc="0" normalizeH="0" baseline="0" noProof="0" dirty="0">
+                  <a:ln>
+                    <a:noFill/>
+                  </a:ln>
+                  <a:solidFill>
+                    <a:prstClr val="white"/>
+                  </a:solidFill>
+                  <a:effectLst/>
+                  <a:uLnTx/>
+                  <a:uFillTx/>
+                  <a:latin typeface="Arial" panose="020B0604020202020204"/>
+                </a:rPr>
+                <a:t> Patient</a:t>
+              </a:r>
+            </a:p>
+          </p:txBody>
+        </p:sp>
+        <p:sp>
+          <p:nvSpPr>
+            <p:cNvPr id="46" name="Alternate Process 27">
+              <a:extLst>
+                <a:ext uri="{FF2B5EF4-FFF2-40B4-BE49-F238E27FC236}">
+                  <a16:creationId xmlns:a16="http://schemas.microsoft.com/office/drawing/2014/main" id="{854006AF-031C-8927-F2B7-D9D7EAFEC76B}"/>
+                </a:ext>
+              </a:extLst>
+            </p:cNvPr>
+            <p:cNvSpPr/>
+            <p:nvPr/>
+          </p:nvSpPr>
+          <p:spPr>
+            <a:xfrm>
+              <a:off x="2951570" y="1640479"/>
+              <a:ext cx="1328883" cy="415359"/>
+            </a:xfrm>
+            <a:prstGeom prst="flowChartAlternateProcess">
+              <a:avLst/>
+            </a:prstGeom>
+            <a:solidFill>
+              <a:srgbClr val="51657F">
+                <a:lumMod val="60000"/>
+                <a:lumOff val="40000"/>
+              </a:srgbClr>
+            </a:solidFill>
+            <a:ln w="25400" cap="flat" cmpd="sng" algn="ctr">
+              <a:solidFill>
+                <a:srgbClr val="2A323A">
+                  <a:lumMod val="75000"/>
+                  <a:lumOff val="25000"/>
+                </a:srgbClr>
+              </a:solidFill>
+              <a:prstDash val="solid"/>
+              <a:miter lim="800000"/>
+            </a:ln>
+            <a:effectLst/>
+          </p:spPr>
+          <p:txBody>
+            <a:bodyPr lIns="0" rIns="0" rtlCol="0" anchor="ctr"/>
+            <a:lstStyle/>
+            <a:p>
+              <a:pPr marL="0" marR="0" lvl="0" indent="0" algn="ctr" defTabSz="685748" eaLnBrk="1" fontAlgn="auto" latinLnBrk="0" hangingPunct="1">
+                <a:lnSpc>
+                  <a:spcPct val="100000"/>
+                </a:lnSpc>
+                <a:spcBef>
+                  <a:spcPts val="0"/>
+                </a:spcBef>
+                <a:spcAft>
+                  <a:spcPts val="0"/>
+                </a:spcAft>
+                <a:buClrTx/>
+                <a:buSzTx/>
+                <a:buFontTx/>
+                <a:buNone/>
+                <a:tabLst/>
+                <a:defRPr/>
+              </a:pPr>
+              <a:r>
+                <a:rPr kumimoji="0" lang="en-US" sz="1050" b="1" i="0" u="none" strike="noStrike" kern="0" cap="none" spc="0" normalizeH="0" baseline="0" noProof="0" dirty="0">
+                  <a:ln>
+                    <a:noFill/>
+                  </a:ln>
+                  <a:solidFill>
+                    <a:prstClr val="white"/>
+                  </a:solidFill>
+                  <a:effectLst/>
+                  <a:uLnTx/>
+                  <a:uFillTx/>
+                  <a:latin typeface="Arial" panose="020B0604020202020204"/>
+                </a:rPr>
+                <a:t>PCT Organization</a:t>
+              </a:r>
+            </a:p>
+            <a:p>
+              <a:pPr marL="0" marR="0" lvl="0" indent="0" algn="ctr" defTabSz="685748" eaLnBrk="1" fontAlgn="auto" latinLnBrk="0" hangingPunct="1">
+                <a:lnSpc>
+                  <a:spcPct val="100000"/>
+                </a:lnSpc>
+                <a:spcBef>
+                  <a:spcPts val="0"/>
+                </a:spcBef>
+                <a:spcAft>
+                  <a:spcPts val="0"/>
+                </a:spcAft>
+                <a:buClrTx/>
+                <a:buSzTx/>
+                <a:buFontTx/>
+                <a:buNone/>
+                <a:tabLst/>
+                <a:defRPr/>
+              </a:pPr>
+              <a:r>
+                <a:rPr kumimoji="0" lang="en-US" sz="1050" b="1" i="1" u="none" strike="noStrike" kern="0" cap="none" spc="0" normalizeH="0" baseline="0" noProof="0" dirty="0">
+                  <a:ln>
+                    <a:noFill/>
+                  </a:ln>
+                  <a:solidFill>
+                    <a:prstClr val="white"/>
+                  </a:solidFill>
+                  <a:effectLst/>
+                  <a:uLnTx/>
+                  <a:uFillTx/>
+                  <a:latin typeface="Arial" panose="020B0604020202020204"/>
+                </a:rPr>
+                <a:t>(Payer)</a:t>
+              </a:r>
+            </a:p>
+          </p:txBody>
+        </p:sp>
+        <p:sp>
+          <p:nvSpPr>
+            <p:cNvPr id="47" name="Alternate Process 30">
+              <a:extLst>
+                <a:ext uri="{FF2B5EF4-FFF2-40B4-BE49-F238E27FC236}">
+                  <a16:creationId xmlns:a16="http://schemas.microsoft.com/office/drawing/2014/main" id="{8AB9B00A-C476-60CF-CD30-37440EA4F019}"/>
+                </a:ext>
+              </a:extLst>
+            </p:cNvPr>
+            <p:cNvSpPr/>
+            <p:nvPr/>
+          </p:nvSpPr>
+          <p:spPr>
+            <a:xfrm>
+              <a:off x="1688401" y="1632373"/>
+              <a:ext cx="1146385" cy="415359"/>
+            </a:xfrm>
+            <a:prstGeom prst="flowChartAlternateProcess">
+              <a:avLst/>
+            </a:prstGeom>
+            <a:solidFill>
+              <a:srgbClr val="51657F">
+                <a:lumMod val="60000"/>
+                <a:lumOff val="40000"/>
+              </a:srgbClr>
+            </a:solidFill>
+            <a:ln w="25400" cap="flat" cmpd="sng" algn="ctr">
+              <a:solidFill>
+                <a:srgbClr val="2A323A">
+                  <a:lumMod val="75000"/>
+                  <a:lumOff val="25000"/>
+                </a:srgbClr>
+              </a:solidFill>
+              <a:prstDash val="solid"/>
+              <a:miter lim="800000"/>
+            </a:ln>
+            <a:effectLst/>
+          </p:spPr>
+          <p:txBody>
+            <a:bodyPr lIns="0" rIns="0" rtlCol="0" anchor="ctr"/>
+            <a:lstStyle/>
+            <a:p>
+              <a:pPr marL="0" marR="0" lvl="0" indent="0" algn="ctr" defTabSz="685748" eaLnBrk="1" fontAlgn="auto" latinLnBrk="0" hangingPunct="1">
+                <a:lnSpc>
+                  <a:spcPct val="100000"/>
+                </a:lnSpc>
+                <a:spcBef>
+                  <a:spcPts val="0"/>
+                </a:spcBef>
+                <a:spcAft>
+                  <a:spcPts val="0"/>
+                </a:spcAft>
+                <a:buClrTx/>
+                <a:buSzTx/>
+                <a:buFontTx/>
+                <a:buNone/>
+                <a:tabLst/>
+                <a:defRPr/>
+              </a:pPr>
+              <a:r>
+                <a:rPr kumimoji="0" lang="en-US" sz="1050" b="1" i="0" u="none" strike="noStrike" kern="0" cap="none" spc="0" normalizeH="0" baseline="0" noProof="0" dirty="0">
+                  <a:ln>
+                    <a:noFill/>
+                  </a:ln>
+                  <a:solidFill>
+                    <a:prstClr val="white"/>
+                  </a:solidFill>
+                  <a:effectLst/>
+                  <a:uLnTx/>
+                  <a:uFillTx/>
+                  <a:latin typeface="Arial" panose="020B0604020202020204"/>
+                </a:rPr>
+                <a:t>PCT Coverage</a:t>
+              </a:r>
+              <a:endParaRPr kumimoji="0" lang="en-US" sz="1050" b="1" i="1" u="none" strike="noStrike" kern="0" cap="none" spc="0" normalizeH="0" baseline="0" noProof="0" dirty="0">
+                <a:ln>
+                  <a:noFill/>
+                </a:ln>
+                <a:solidFill>
+                  <a:prstClr val="white"/>
+                </a:solidFill>
+                <a:effectLst/>
+                <a:uLnTx/>
+                <a:uFillTx/>
+                <a:latin typeface="Arial" panose="020B0604020202020204"/>
+              </a:endParaRPr>
+            </a:p>
+          </p:txBody>
+        </p:sp>
+        <p:grpSp>
+          <p:nvGrpSpPr>
+            <p:cNvPr id="48" name="Group 47">
+              <a:extLst>
+                <a:ext uri="{FF2B5EF4-FFF2-40B4-BE49-F238E27FC236}">
+                  <a16:creationId xmlns:a16="http://schemas.microsoft.com/office/drawing/2014/main" id="{41904F3E-BEC6-1488-6C64-B22F6F4A1087}"/>
+                </a:ext>
+              </a:extLst>
+            </p:cNvPr>
+            <p:cNvGrpSpPr/>
+            <p:nvPr/>
+          </p:nvGrpSpPr>
+          <p:grpSpPr>
+            <a:xfrm>
+              <a:off x="402708" y="2190733"/>
+              <a:ext cx="3666904" cy="1857494"/>
+              <a:chOff x="1053880" y="1891273"/>
+              <a:chExt cx="4337302" cy="2227479"/>
+            </a:xfrm>
+          </p:grpSpPr>
+          <p:sp>
+            <p:nvSpPr>
+              <p:cNvPr id="59" name="Alternate Process 41">
+                <a:extLst>
+                  <a:ext uri="{FF2B5EF4-FFF2-40B4-BE49-F238E27FC236}">
+                    <a16:creationId xmlns:a16="http://schemas.microsoft.com/office/drawing/2014/main" id="{8921604A-18FE-45A8-C30F-CDBEFB59EC69}"/>
+                  </a:ext>
+                </a:extLst>
+              </p:cNvPr>
+              <p:cNvSpPr/>
+              <p:nvPr/>
+            </p:nvSpPr>
+            <p:spPr>
+              <a:xfrm>
+                <a:off x="1053880" y="1891273"/>
+                <a:ext cx="4337302" cy="2227479"/>
+              </a:xfrm>
+              <a:prstGeom prst="flowChartAlternateProcess">
+                <a:avLst/>
+              </a:prstGeom>
+              <a:solidFill>
+                <a:srgbClr val="DFD5A9">
+                  <a:lumMod val="60000"/>
+                  <a:lumOff val="40000"/>
+                </a:srgbClr>
+              </a:solidFill>
+              <a:ln w="38100" cap="flat" cmpd="sng" algn="ctr">
+                <a:solidFill>
+                  <a:srgbClr val="DFD5A9">
+                    <a:shade val="50000"/>
+                  </a:srgbClr>
+                </a:solidFill>
+                <a:prstDash val="sysDash"/>
+                <a:miter lim="800000"/>
+                <a:extLst>
+                  <a:ext uri="{C807C97D-BFC1-408E-A445-0C87EB9F89A2}">
+                    <ask:lineSketchStyleProps xmlns:ask="http://schemas.microsoft.com/office/drawing/2018/sketchyshapes" sd="1219033472">
+                      <a:custGeom>
+                        <a:avLst/>
+                        <a:gdLst>
+                          <a:gd name="connsiteX0" fmla="*/ 0 w 4148222"/>
+                          <a:gd name="connsiteY0" fmla="*/ 312761 h 1876566"/>
+                          <a:gd name="connsiteX1" fmla="*/ 312761 w 4148222"/>
+                          <a:gd name="connsiteY1" fmla="*/ 0 h 1876566"/>
+                          <a:gd name="connsiteX2" fmla="*/ 935105 w 4148222"/>
+                          <a:gd name="connsiteY2" fmla="*/ 0 h 1876566"/>
+                          <a:gd name="connsiteX3" fmla="*/ 1416540 w 4148222"/>
+                          <a:gd name="connsiteY3" fmla="*/ 0 h 1876566"/>
+                          <a:gd name="connsiteX4" fmla="*/ 2003657 w 4148222"/>
+                          <a:gd name="connsiteY4" fmla="*/ 0 h 1876566"/>
+                          <a:gd name="connsiteX5" fmla="*/ 2520320 w 4148222"/>
+                          <a:gd name="connsiteY5" fmla="*/ 0 h 1876566"/>
+                          <a:gd name="connsiteX6" fmla="*/ 3142663 w 4148222"/>
+                          <a:gd name="connsiteY6" fmla="*/ 0 h 1876566"/>
+                          <a:gd name="connsiteX7" fmla="*/ 3835461 w 4148222"/>
+                          <a:gd name="connsiteY7" fmla="*/ 0 h 1876566"/>
+                          <a:gd name="connsiteX8" fmla="*/ 4148222 w 4148222"/>
+                          <a:gd name="connsiteY8" fmla="*/ 312761 h 1876566"/>
+                          <a:gd name="connsiteX9" fmla="*/ 4148222 w 4148222"/>
+                          <a:gd name="connsiteY9" fmla="*/ 938283 h 1876566"/>
+                          <a:gd name="connsiteX10" fmla="*/ 4148222 w 4148222"/>
+                          <a:gd name="connsiteY10" fmla="*/ 1563805 h 1876566"/>
+                          <a:gd name="connsiteX11" fmla="*/ 3835461 w 4148222"/>
+                          <a:gd name="connsiteY11" fmla="*/ 1876566 h 1876566"/>
+                          <a:gd name="connsiteX12" fmla="*/ 3177890 w 4148222"/>
+                          <a:gd name="connsiteY12" fmla="*/ 1876566 h 1876566"/>
+                          <a:gd name="connsiteX13" fmla="*/ 2661228 w 4148222"/>
+                          <a:gd name="connsiteY13" fmla="*/ 1876566 h 1876566"/>
+                          <a:gd name="connsiteX14" fmla="*/ 2179792 w 4148222"/>
+                          <a:gd name="connsiteY14" fmla="*/ 1876566 h 1876566"/>
+                          <a:gd name="connsiteX15" fmla="*/ 1663129 w 4148222"/>
+                          <a:gd name="connsiteY15" fmla="*/ 1876566 h 1876566"/>
+                          <a:gd name="connsiteX16" fmla="*/ 1111240 w 4148222"/>
+                          <a:gd name="connsiteY16" fmla="*/ 1876566 h 1876566"/>
+                          <a:gd name="connsiteX17" fmla="*/ 312761 w 4148222"/>
+                          <a:gd name="connsiteY17" fmla="*/ 1876566 h 1876566"/>
+                          <a:gd name="connsiteX18" fmla="*/ 0 w 4148222"/>
+                          <a:gd name="connsiteY18" fmla="*/ 1563805 h 1876566"/>
+                          <a:gd name="connsiteX19" fmla="*/ 0 w 4148222"/>
+                          <a:gd name="connsiteY19" fmla="*/ 913262 h 1876566"/>
+                          <a:gd name="connsiteX20" fmla="*/ 0 w 4148222"/>
+                          <a:gd name="connsiteY20" fmla="*/ 312761 h 1876566"/>
+                        </a:gdLst>
+                        <a:ahLst/>
+                        <a:cxnLst>
+                          <a:cxn ang="0">
+                            <a:pos x="connsiteX0" y="connsiteY0"/>
+                          </a:cxn>
+                          <a:cxn ang="0">
+                            <a:pos x="connsiteX1" y="connsiteY1"/>
+                          </a:cxn>
+                          <a:cxn ang="0">
+                            <a:pos x="connsiteX2" y="connsiteY2"/>
+                          </a:cxn>
+                          <a:cxn ang="0">
+                            <a:pos x="connsiteX3" y="connsiteY3"/>
+                          </a:cxn>
+                          <a:cxn ang="0">
+                            <a:pos x="connsiteX4" y="connsiteY4"/>
+                          </a:cxn>
+                          <a:cxn ang="0">
+                            <a:pos x="connsiteX5" y="connsiteY5"/>
+                          </a:cxn>
+                          <a:cxn ang="0">
+                            <a:pos x="connsiteX6" y="connsiteY6"/>
+                          </a:cxn>
+                          <a:cxn ang="0">
+                            <a:pos x="connsiteX7" y="connsiteY7"/>
+                          </a:cxn>
+                          <a:cxn ang="0">
+                            <a:pos x="connsiteX8" y="connsiteY8"/>
+                          </a:cxn>
+                          <a:cxn ang="0">
+                            <a:pos x="connsiteX9" y="connsiteY9"/>
+                          </a:cxn>
+                          <a:cxn ang="0">
+                            <a:pos x="connsiteX10" y="connsiteY10"/>
+                          </a:cxn>
+                          <a:cxn ang="0">
+                            <a:pos x="connsiteX11" y="connsiteY11"/>
+                          </a:cxn>
+                          <a:cxn ang="0">
+                            <a:pos x="connsiteX12" y="connsiteY12"/>
+                          </a:cxn>
+                          <a:cxn ang="0">
+                            <a:pos x="connsiteX13" y="connsiteY13"/>
+                          </a:cxn>
+                          <a:cxn ang="0">
+                            <a:pos x="connsiteX14" y="connsiteY14"/>
+                          </a:cxn>
+                          <a:cxn ang="0">
+                            <a:pos x="connsiteX15" y="connsiteY15"/>
+                          </a:cxn>
+                          <a:cxn ang="0">
+                            <a:pos x="connsiteX16" y="connsiteY16"/>
+                          </a:cxn>
+                          <a:cxn ang="0">
+                            <a:pos x="connsiteX17" y="connsiteY17"/>
+                          </a:cxn>
+                          <a:cxn ang="0">
+                            <a:pos x="connsiteX18" y="connsiteY18"/>
+                          </a:cxn>
+                          <a:cxn ang="0">
+                            <a:pos x="connsiteX19" y="connsiteY19"/>
+                          </a:cxn>
+                          <a:cxn ang="0">
+                            <a:pos x="connsiteX20" y="connsiteY20"/>
+                          </a:cxn>
+                        </a:cxnLst>
+                        <a:rect l="l" t="t" r="r" b="b"/>
+                        <a:pathLst>
+                          <a:path w="4148222" h="1876566" fill="none" extrusionOk="0">
+                            <a:moveTo>
+                              <a:pt x="0" y="312761"/>
+                            </a:moveTo>
+                            <a:cubicBezTo>
+                              <a:pt x="5447" y="150812"/>
+                              <a:pt x="121583" y="9727"/>
+                              <a:pt x="312761" y="0"/>
+                            </a:cubicBezTo>
+                            <a:cubicBezTo>
+                              <a:pt x="515762" y="19403"/>
+                              <a:pt x="675124" y="17524"/>
+                              <a:pt x="935105" y="0"/>
+                            </a:cubicBezTo>
+                            <a:cubicBezTo>
+                              <a:pt x="1195086" y="-17524"/>
+                              <a:pt x="1251901" y="13555"/>
+                              <a:pt x="1416540" y="0"/>
+                            </a:cubicBezTo>
+                            <a:cubicBezTo>
+                              <a:pt x="1581179" y="-13555"/>
+                              <a:pt x="1827054" y="-19825"/>
+                              <a:pt x="2003657" y="0"/>
+                            </a:cubicBezTo>
+                            <a:cubicBezTo>
+                              <a:pt x="2180260" y="19825"/>
+                              <a:pt x="2401760" y="-5134"/>
+                              <a:pt x="2520320" y="0"/>
+                            </a:cubicBezTo>
+                            <a:cubicBezTo>
+                              <a:pt x="2638880" y="5134"/>
+                              <a:pt x="2930791" y="-30835"/>
+                              <a:pt x="3142663" y="0"/>
+                            </a:cubicBezTo>
+                            <a:cubicBezTo>
+                              <a:pt x="3354535" y="30835"/>
+                              <a:pt x="3634367" y="-17717"/>
+                              <a:pt x="3835461" y="0"/>
+                            </a:cubicBezTo>
+                            <a:cubicBezTo>
+                              <a:pt x="3996621" y="36082"/>
+                              <a:pt x="4143611" y="125506"/>
+                              <a:pt x="4148222" y="312761"/>
+                            </a:cubicBezTo>
+                            <a:cubicBezTo>
+                              <a:pt x="4123832" y="532411"/>
+                              <a:pt x="4150959" y="723092"/>
+                              <a:pt x="4148222" y="938283"/>
+                            </a:cubicBezTo>
+                            <a:cubicBezTo>
+                              <a:pt x="4145485" y="1153474"/>
+                              <a:pt x="4130315" y="1328415"/>
+                              <a:pt x="4148222" y="1563805"/>
+                            </a:cubicBezTo>
+                            <a:cubicBezTo>
+                              <a:pt x="4140559" y="1740835"/>
+                              <a:pt x="4018425" y="1904287"/>
+                              <a:pt x="3835461" y="1876566"/>
+                            </a:cubicBezTo>
+                            <a:cubicBezTo>
+                              <a:pt x="3692839" y="1878403"/>
+                              <a:pt x="3500945" y="1908911"/>
+                              <a:pt x="3177890" y="1876566"/>
+                            </a:cubicBezTo>
+                            <a:cubicBezTo>
+                              <a:pt x="2854835" y="1844221"/>
+                              <a:pt x="2873635" y="1850766"/>
+                              <a:pt x="2661228" y="1876566"/>
+                            </a:cubicBezTo>
+                            <a:cubicBezTo>
+                              <a:pt x="2448821" y="1902366"/>
+                              <a:pt x="2335782" y="1853617"/>
+                              <a:pt x="2179792" y="1876566"/>
+                            </a:cubicBezTo>
+                            <a:cubicBezTo>
+                              <a:pt x="2023802" y="1899515"/>
+                              <a:pt x="1916795" y="1901333"/>
+                              <a:pt x="1663129" y="1876566"/>
+                            </a:cubicBezTo>
+                            <a:cubicBezTo>
+                              <a:pt x="1409463" y="1851799"/>
+                              <a:pt x="1316374" y="1879065"/>
+                              <a:pt x="1111240" y="1876566"/>
+                            </a:cubicBezTo>
+                            <a:cubicBezTo>
+                              <a:pt x="906106" y="1874067"/>
+                              <a:pt x="649230" y="1914853"/>
+                              <a:pt x="312761" y="1876566"/>
+                            </a:cubicBezTo>
+                            <a:cubicBezTo>
+                              <a:pt x="127444" y="1889058"/>
+                              <a:pt x="27462" y="1742702"/>
+                              <a:pt x="0" y="1563805"/>
+                            </a:cubicBezTo>
+                            <a:cubicBezTo>
+                              <a:pt x="23645" y="1429589"/>
+                              <a:pt x="26200" y="1122235"/>
+                              <a:pt x="0" y="913262"/>
+                            </a:cubicBezTo>
+                            <a:cubicBezTo>
+                              <a:pt x="-26200" y="704289"/>
+                              <a:pt x="-11285" y="445648"/>
+                              <a:pt x="0" y="312761"/>
+                            </a:cubicBezTo>
+                            <a:close/>
+                          </a:path>
+                          <a:path w="4148222" h="1876566" stroke="0" extrusionOk="0">
+                            <a:moveTo>
+                              <a:pt x="0" y="312761"/>
+                            </a:moveTo>
+                            <a:cubicBezTo>
+                              <a:pt x="-35672" y="118024"/>
+                              <a:pt x="118260" y="8170"/>
+                              <a:pt x="312761" y="0"/>
+                            </a:cubicBezTo>
+                            <a:cubicBezTo>
+                              <a:pt x="610023" y="-27692"/>
+                              <a:pt x="688344" y="10336"/>
+                              <a:pt x="970332" y="0"/>
+                            </a:cubicBezTo>
+                            <a:cubicBezTo>
+                              <a:pt x="1252320" y="-10336"/>
+                              <a:pt x="1406577" y="-22665"/>
+                              <a:pt x="1522221" y="0"/>
+                            </a:cubicBezTo>
+                            <a:cubicBezTo>
+                              <a:pt x="1637865" y="22665"/>
+                              <a:pt x="1930372" y="929"/>
+                              <a:pt x="2038884" y="0"/>
+                            </a:cubicBezTo>
+                            <a:cubicBezTo>
+                              <a:pt x="2147396" y="-929"/>
+                              <a:pt x="2487634" y="19222"/>
+                              <a:pt x="2661228" y="0"/>
+                            </a:cubicBezTo>
+                            <a:cubicBezTo>
+                              <a:pt x="2834822" y="-19222"/>
+                              <a:pt x="3089860" y="-24136"/>
+                              <a:pt x="3213117" y="0"/>
+                            </a:cubicBezTo>
+                            <a:cubicBezTo>
+                              <a:pt x="3336374" y="24136"/>
+                              <a:pt x="3554658" y="22469"/>
+                              <a:pt x="3835461" y="0"/>
+                            </a:cubicBezTo>
+                            <a:cubicBezTo>
+                              <a:pt x="4004524" y="-34995"/>
+                              <a:pt x="4129933" y="165445"/>
+                              <a:pt x="4148222" y="312761"/>
+                            </a:cubicBezTo>
+                            <a:cubicBezTo>
+                              <a:pt x="4121221" y="589426"/>
+                              <a:pt x="4171625" y="754499"/>
+                              <a:pt x="4148222" y="913262"/>
+                            </a:cubicBezTo>
+                            <a:cubicBezTo>
+                              <a:pt x="4124819" y="1072025"/>
+                              <a:pt x="4122801" y="1307280"/>
+                              <a:pt x="4148222" y="1563805"/>
+                            </a:cubicBezTo>
+                            <a:cubicBezTo>
+                              <a:pt x="4153448" y="1744318"/>
+                              <a:pt x="4009302" y="1888039"/>
+                              <a:pt x="3835461" y="1876566"/>
+                            </a:cubicBezTo>
+                            <a:cubicBezTo>
+                              <a:pt x="3671403" y="1891255"/>
+                              <a:pt x="3576686" y="1871103"/>
+                              <a:pt x="3354025" y="1876566"/>
+                            </a:cubicBezTo>
+                            <a:cubicBezTo>
+                              <a:pt x="3131364" y="1882029"/>
+                              <a:pt x="2916645" y="1904793"/>
+                              <a:pt x="2696455" y="1876566"/>
+                            </a:cubicBezTo>
+                            <a:cubicBezTo>
+                              <a:pt x="2476265" y="1848340"/>
+                              <a:pt x="2432046" y="1872658"/>
+                              <a:pt x="2179792" y="1876566"/>
+                            </a:cubicBezTo>
+                            <a:cubicBezTo>
+                              <a:pt x="1927538" y="1880474"/>
+                              <a:pt x="1732801" y="1902720"/>
+                              <a:pt x="1592675" y="1876566"/>
+                            </a:cubicBezTo>
+                            <a:cubicBezTo>
+                              <a:pt x="1452549" y="1850412"/>
+                              <a:pt x="1210750" y="1887462"/>
+                              <a:pt x="935105" y="1876566"/>
+                            </a:cubicBezTo>
+                            <a:cubicBezTo>
+                              <a:pt x="659460" y="1865671"/>
+                              <a:pt x="574921" y="1845724"/>
+                              <a:pt x="312761" y="1876566"/>
+                            </a:cubicBezTo>
+                            <a:cubicBezTo>
+                              <a:pt x="126796" y="1900225"/>
+                              <a:pt x="30351" y="1759091"/>
+                              <a:pt x="0" y="1563805"/>
+                            </a:cubicBezTo>
+                            <a:cubicBezTo>
+                              <a:pt x="-17858" y="1349269"/>
+                              <a:pt x="23350" y="1257755"/>
+                              <a:pt x="0" y="963304"/>
+                            </a:cubicBezTo>
+                            <a:cubicBezTo>
+                              <a:pt x="-23350" y="668853"/>
+                              <a:pt x="19740" y="621988"/>
+                              <a:pt x="0" y="312761"/>
+                            </a:cubicBezTo>
+                            <a:close/>
+                          </a:path>
+                        </a:pathLst>
+                      </a:custGeom>
+                      <ask:type>
+                        <ask:lineSketchNone/>
+                      </ask:type>
+                    </ask:lineSketchStyleProps>
+                  </a:ext>
+                </a:extLst>
+              </a:ln>
+              <a:effectLst/>
+            </p:spPr>
+            <p:txBody>
+              <a:bodyPr lIns="0" rIns="0" rtlCol="0" anchor="t" anchorCtr="0"/>
+              <a:lstStyle/>
+              <a:p>
+                <a:pPr marL="0" marR="0" lvl="0" indent="0" defTabSz="685748" eaLnBrk="1" fontAlgn="auto" latinLnBrk="0" hangingPunct="1">
+                  <a:lnSpc>
+                    <a:spcPct val="100000"/>
+                  </a:lnSpc>
+                  <a:spcBef>
+                    <a:spcPts val="0"/>
+                  </a:spcBef>
+                  <a:spcAft>
+                    <a:spcPts val="0"/>
+                  </a:spcAft>
+                  <a:buClrTx/>
+                  <a:buSzTx/>
+                  <a:buFontTx/>
+                  <a:buNone/>
+                  <a:tabLst/>
+                  <a:defRPr/>
+                </a:pPr>
+                <a:endParaRPr kumimoji="0" lang="en-US" sz="1050" b="1" i="0" u="none" strike="noStrike" kern="0" cap="none" spc="0" normalizeH="0" baseline="0" noProof="0">
+                  <a:ln>
+                    <a:noFill/>
+                  </a:ln>
+                  <a:solidFill>
+                    <a:srgbClr val="474749">
+                      <a:lumMod val="95000"/>
+                      <a:lumOff val="5000"/>
+                    </a:srgbClr>
+                  </a:solidFill>
+                  <a:effectLst/>
+                  <a:uLnTx/>
+                  <a:uFillTx/>
+                  <a:latin typeface="Arial" panose="020B0604020202020204"/>
+                </a:endParaRPr>
+              </a:p>
+            </p:txBody>
+          </p:sp>
+          <p:sp>
+            <p:nvSpPr>
+              <p:cNvPr id="60" name="Alternate Process 31">
+                <a:extLst>
+                  <a:ext uri="{FF2B5EF4-FFF2-40B4-BE49-F238E27FC236}">
+                    <a16:creationId xmlns:a16="http://schemas.microsoft.com/office/drawing/2014/main" id="{F6C23A94-FEDB-67D1-5687-5848BED26530}"/>
+                  </a:ext>
+                </a:extLst>
+              </p:cNvPr>
+              <p:cNvSpPr/>
+              <p:nvPr/>
+            </p:nvSpPr>
+            <p:spPr>
+              <a:xfrm>
+                <a:off x="1199856" y="2055347"/>
+                <a:ext cx="2473277" cy="1975577"/>
+              </a:xfrm>
+              <a:prstGeom prst="flowChartAlternateProcess">
+                <a:avLst/>
+              </a:prstGeom>
+              <a:solidFill>
+                <a:srgbClr val="ED7D31"/>
+              </a:solidFill>
+              <a:ln w="12700" cap="flat" cmpd="sng" algn="ctr">
+                <a:solidFill>
+                  <a:srgbClr val="DFD5A9">
+                    <a:shade val="50000"/>
+                  </a:srgbClr>
+                </a:solidFill>
+                <a:prstDash val="solid"/>
+                <a:miter lim="800000"/>
+              </a:ln>
+              <a:effectLst/>
+            </p:spPr>
+            <p:txBody>
+              <a:bodyPr lIns="0" rIns="0" rtlCol="0" anchor="t" anchorCtr="0"/>
+              <a:lstStyle/>
+              <a:p>
+                <a:pPr marL="0" marR="0" lvl="0" indent="0" algn="ctr" defTabSz="685748" eaLnBrk="1" fontAlgn="auto" latinLnBrk="0" hangingPunct="1">
+                  <a:lnSpc>
+                    <a:spcPct val="100000"/>
+                  </a:lnSpc>
+                  <a:spcBef>
+                    <a:spcPts val="0"/>
+                  </a:spcBef>
+                  <a:spcAft>
+                    <a:spcPts val="0"/>
+                  </a:spcAft>
+                  <a:buClrTx/>
+                  <a:buSzTx/>
+                  <a:buFontTx/>
+                  <a:buNone/>
+                  <a:tabLst/>
+                  <a:defRPr/>
+                </a:pPr>
+                <a:r>
+                  <a:rPr kumimoji="0" lang="en-US" sz="1050" b="1" i="0" u="none" strike="noStrike" kern="0" cap="none" spc="0" normalizeH="0" baseline="0" noProof="0">
+                    <a:ln>
+                      <a:noFill/>
+                    </a:ln>
+                    <a:solidFill>
+                      <a:srgbClr val="474749">
+                        <a:lumMod val="95000"/>
+                        <a:lumOff val="5000"/>
+                      </a:srgbClr>
+                    </a:solidFill>
+                    <a:effectLst/>
+                    <a:uLnTx/>
+                    <a:uFillTx/>
+                    <a:latin typeface="Arial" panose="020B0604020202020204"/>
+                  </a:rPr>
+                  <a:t>Good Faith Estimate (GFE)</a:t>
+                </a:r>
+              </a:p>
+              <a:p>
+                <a:pPr marL="0" marR="0" lvl="0" indent="0" algn="ctr" defTabSz="685748" eaLnBrk="1" fontAlgn="auto" latinLnBrk="0" hangingPunct="1">
+                  <a:lnSpc>
+                    <a:spcPct val="100000"/>
+                  </a:lnSpc>
+                  <a:spcBef>
+                    <a:spcPts val="0"/>
+                  </a:spcBef>
+                  <a:spcAft>
+                    <a:spcPts val="0"/>
+                  </a:spcAft>
+                  <a:buClrTx/>
+                  <a:buSzTx/>
+                  <a:buFontTx/>
+                  <a:buNone/>
+                  <a:tabLst/>
+                  <a:defRPr/>
+                </a:pPr>
+                <a:endParaRPr kumimoji="0" lang="en-US" sz="1050" b="1" i="0" u="none" strike="noStrike" kern="0" cap="none" spc="0" normalizeH="0" baseline="0" noProof="0">
+                  <a:ln>
+                    <a:noFill/>
+                  </a:ln>
+                  <a:solidFill>
+                    <a:srgbClr val="474749">
+                      <a:lumMod val="95000"/>
+                      <a:lumOff val="5000"/>
+                    </a:srgbClr>
+                  </a:solidFill>
+                  <a:effectLst/>
+                  <a:uLnTx/>
+                  <a:uFillTx/>
+                  <a:latin typeface="Arial" panose="020B0604020202020204"/>
+                </a:endParaRPr>
+              </a:p>
+              <a:p>
+                <a:pPr marL="214313" marR="0" lvl="0" indent="-214313" defTabSz="685748" eaLnBrk="1" fontAlgn="auto" latinLnBrk="0" hangingPunct="1">
+                  <a:lnSpc>
+                    <a:spcPct val="100000"/>
+                  </a:lnSpc>
+                  <a:spcBef>
+                    <a:spcPts val="0"/>
+                  </a:spcBef>
+                  <a:spcAft>
+                    <a:spcPts val="0"/>
+                  </a:spcAft>
+                  <a:buClrTx/>
+                  <a:buSzTx/>
+                  <a:buFont typeface="Arial" panose="020B0604020202020204" pitchFamily="34" charset="0"/>
+                  <a:buChar char="•"/>
+                  <a:tabLst/>
+                  <a:defRPr/>
+                </a:pPr>
+                <a:r>
+                  <a:rPr kumimoji="0" lang="en-US" sz="1050" b="1" i="0" u="none" strike="noStrike" kern="0" cap="none" spc="0" normalizeH="0" baseline="0" noProof="0">
+                    <a:ln>
+                      <a:noFill/>
+                    </a:ln>
+                    <a:solidFill>
+                      <a:srgbClr val="474749">
+                        <a:lumMod val="95000"/>
+                        <a:lumOff val="5000"/>
+                      </a:srgbClr>
+                    </a:solidFill>
+                    <a:effectLst/>
+                    <a:uLnTx/>
+                    <a:uFillTx/>
+                    <a:latin typeface="Arial" panose="020B0604020202020204"/>
+                  </a:rPr>
+                  <a:t>Estimated  Date of Service</a:t>
+                </a:r>
+              </a:p>
+              <a:p>
+                <a:pPr marL="214313" marR="0" lvl="0" indent="-214313" defTabSz="685748" eaLnBrk="1" fontAlgn="auto" latinLnBrk="0" hangingPunct="1">
+                  <a:lnSpc>
+                    <a:spcPct val="100000"/>
+                  </a:lnSpc>
+                  <a:spcBef>
+                    <a:spcPts val="0"/>
+                  </a:spcBef>
+                  <a:spcAft>
+                    <a:spcPts val="0"/>
+                  </a:spcAft>
+                  <a:buClrTx/>
+                  <a:buSzTx/>
+                  <a:buFont typeface="Arial" panose="020B0604020202020204" pitchFamily="34" charset="0"/>
+                  <a:buChar char="•"/>
+                  <a:tabLst/>
+                  <a:defRPr/>
+                </a:pPr>
+                <a:r>
+                  <a:rPr kumimoji="0" lang="en-US" sz="1050" b="1" i="0" u="none" strike="noStrike" kern="0" cap="none" spc="0" normalizeH="0" baseline="0" noProof="0">
+                    <a:ln>
+                      <a:noFill/>
+                    </a:ln>
+                    <a:solidFill>
+                      <a:srgbClr val="474749">
+                        <a:lumMod val="95000"/>
+                        <a:lumOff val="5000"/>
+                      </a:srgbClr>
+                    </a:solidFill>
+                    <a:effectLst/>
+                    <a:uLnTx/>
+                    <a:uFillTx/>
+                    <a:latin typeface="Arial" panose="020B0604020202020204"/>
+                  </a:rPr>
+                  <a:t>Diagnoses/Procedures</a:t>
+                </a:r>
+              </a:p>
+              <a:p>
+                <a:pPr marL="214313" marR="0" lvl="0" indent="-214313" defTabSz="685748" eaLnBrk="1" fontAlgn="auto" latinLnBrk="0" hangingPunct="1">
+                  <a:lnSpc>
+                    <a:spcPct val="100000"/>
+                  </a:lnSpc>
+                  <a:spcBef>
+                    <a:spcPts val="0"/>
+                  </a:spcBef>
+                  <a:spcAft>
+                    <a:spcPts val="0"/>
+                  </a:spcAft>
+                  <a:buClrTx/>
+                  <a:buSzTx/>
+                  <a:buFont typeface="Arial" panose="020B0604020202020204" pitchFamily="34" charset="0"/>
+                  <a:buChar char="•"/>
+                  <a:tabLst/>
+                  <a:defRPr/>
+                </a:pPr>
+                <a:r>
+                  <a:rPr kumimoji="0" lang="en-US" sz="1050" b="1" i="0" u="none" strike="noStrike" kern="0" cap="none" spc="0" normalizeH="0" baseline="0" noProof="0">
+                    <a:ln>
+                      <a:noFill/>
+                    </a:ln>
+                    <a:solidFill>
+                      <a:srgbClr val="474749">
+                        <a:lumMod val="95000"/>
+                        <a:lumOff val="5000"/>
+                      </a:srgbClr>
+                    </a:solidFill>
+                    <a:effectLst/>
+                    <a:uLnTx/>
+                    <a:uFillTx/>
+                    <a:latin typeface="Arial" panose="020B0604020202020204"/>
+                  </a:rPr>
+                  <a:t>Line items</a:t>
+                </a:r>
+              </a:p>
+              <a:p>
+                <a:pPr marL="557213" marR="0" lvl="1" indent="-214313" defTabSz="685748" eaLnBrk="1" fontAlgn="auto" latinLnBrk="0" hangingPunct="1">
+                  <a:lnSpc>
+                    <a:spcPct val="100000"/>
+                  </a:lnSpc>
+                  <a:spcBef>
+                    <a:spcPts val="0"/>
+                  </a:spcBef>
+                  <a:spcAft>
+                    <a:spcPts val="0"/>
+                  </a:spcAft>
+                  <a:buClrTx/>
+                  <a:buSzTx/>
+                  <a:buFont typeface="Arial" panose="020B0604020202020204" pitchFamily="34" charset="0"/>
+                  <a:buChar char="•"/>
+                  <a:tabLst/>
+                  <a:defRPr/>
+                </a:pPr>
+                <a:r>
+                  <a:rPr kumimoji="0" lang="en-US" sz="1050" b="1" i="0" u="none" strike="noStrike" kern="0" cap="none" spc="0" normalizeH="0" baseline="0" noProof="0">
+                    <a:ln>
+                      <a:noFill/>
+                    </a:ln>
+                    <a:solidFill>
+                      <a:srgbClr val="474749">
+                        <a:lumMod val="95000"/>
+                        <a:lumOff val="5000"/>
+                      </a:srgbClr>
+                    </a:solidFill>
+                    <a:effectLst/>
+                    <a:uLnTx/>
+                    <a:uFillTx/>
+                    <a:latin typeface="Arial" panose="020B0604020202020204"/>
+                  </a:rPr>
+                  <a:t>Product/Service</a:t>
+                </a:r>
+              </a:p>
+              <a:p>
+                <a:pPr marL="557213" marR="0" lvl="1" indent="-214313" defTabSz="685748" eaLnBrk="1" fontAlgn="auto" latinLnBrk="0" hangingPunct="1">
+                  <a:lnSpc>
+                    <a:spcPct val="100000"/>
+                  </a:lnSpc>
+                  <a:spcBef>
+                    <a:spcPts val="0"/>
+                  </a:spcBef>
+                  <a:spcAft>
+                    <a:spcPts val="0"/>
+                  </a:spcAft>
+                  <a:buClrTx/>
+                  <a:buSzTx/>
+                  <a:buFont typeface="Arial" panose="020B0604020202020204" pitchFamily="34" charset="0"/>
+                  <a:buChar char="•"/>
+                  <a:tabLst/>
+                  <a:defRPr/>
+                </a:pPr>
+                <a:r>
+                  <a:rPr kumimoji="0" lang="en-US" sz="1050" b="1" i="0" u="none" strike="noStrike" kern="0" cap="none" spc="0" normalizeH="0" baseline="0" noProof="0">
+                    <a:ln>
+                      <a:noFill/>
+                    </a:ln>
+                    <a:solidFill>
+                      <a:srgbClr val="474749">
+                        <a:lumMod val="95000"/>
+                        <a:lumOff val="5000"/>
+                      </a:srgbClr>
+                    </a:solidFill>
+                    <a:effectLst/>
+                    <a:uLnTx/>
+                    <a:uFillTx/>
+                    <a:latin typeface="Arial" panose="020B0604020202020204"/>
+                  </a:rPr>
+                  <a:t>Quantity/Price</a:t>
+                </a:r>
+              </a:p>
+              <a:p>
+                <a:pPr marL="214313" marR="0" lvl="0" indent="-214313" defTabSz="685748" eaLnBrk="1" fontAlgn="auto" latinLnBrk="0" hangingPunct="1">
+                  <a:lnSpc>
+                    <a:spcPct val="100000"/>
+                  </a:lnSpc>
+                  <a:spcBef>
+                    <a:spcPts val="0"/>
+                  </a:spcBef>
+                  <a:spcAft>
+                    <a:spcPts val="0"/>
+                  </a:spcAft>
+                  <a:buClrTx/>
+                  <a:buSzTx/>
+                  <a:buFont typeface="Arial" panose="020B0604020202020204" pitchFamily="34" charset="0"/>
+                  <a:buChar char="•"/>
+                  <a:tabLst/>
+                  <a:defRPr/>
+                </a:pPr>
+                <a:r>
+                  <a:rPr kumimoji="0" lang="en-US" sz="1050" b="1" i="0" u="none" strike="noStrike" kern="0" cap="none" spc="0" normalizeH="0" baseline="0" noProof="0">
+                    <a:ln>
+                      <a:noFill/>
+                    </a:ln>
+                    <a:solidFill>
+                      <a:srgbClr val="474749">
+                        <a:lumMod val="95000"/>
+                        <a:lumOff val="5000"/>
+                      </a:srgbClr>
+                    </a:solidFill>
+                    <a:effectLst/>
+                    <a:uLnTx/>
+                    <a:uFillTx/>
+                    <a:latin typeface="Arial" panose="020B0604020202020204"/>
+                  </a:rPr>
+                  <a:t>Total</a:t>
+                </a:r>
+              </a:p>
+              <a:p>
+                <a:pPr marL="214313" marR="0" lvl="0" indent="-214313" defTabSz="685748" eaLnBrk="1" fontAlgn="auto" latinLnBrk="0" hangingPunct="1">
+                  <a:lnSpc>
+                    <a:spcPct val="100000"/>
+                  </a:lnSpc>
+                  <a:spcBef>
+                    <a:spcPts val="0"/>
+                  </a:spcBef>
+                  <a:spcAft>
+                    <a:spcPts val="0"/>
+                  </a:spcAft>
+                  <a:buClrTx/>
+                  <a:buSzTx/>
+                  <a:buFont typeface="Arial" panose="020B0604020202020204" pitchFamily="34" charset="0"/>
+                  <a:buChar char="•"/>
+                  <a:tabLst/>
+                  <a:defRPr/>
+                </a:pPr>
+                <a:endParaRPr kumimoji="0" lang="en-US" sz="1050" b="1" i="0" u="none" strike="noStrike" kern="0" cap="none" spc="0" normalizeH="0" baseline="0" noProof="0">
+                  <a:ln>
+                    <a:noFill/>
+                  </a:ln>
+                  <a:solidFill>
+                    <a:srgbClr val="474749">
+                      <a:lumMod val="95000"/>
+                      <a:lumOff val="5000"/>
+                    </a:srgbClr>
+                  </a:solidFill>
+                  <a:effectLst/>
+                  <a:uLnTx/>
+                  <a:uFillTx/>
+                  <a:latin typeface="Arial" panose="020B0604020202020204"/>
+                </a:endParaRPr>
+              </a:p>
+              <a:p>
+                <a:pPr marL="214313" marR="0" lvl="0" indent="-214313" defTabSz="685748" eaLnBrk="1" fontAlgn="auto" latinLnBrk="0" hangingPunct="1">
+                  <a:lnSpc>
+                    <a:spcPct val="100000"/>
+                  </a:lnSpc>
+                  <a:spcBef>
+                    <a:spcPts val="0"/>
+                  </a:spcBef>
+                  <a:spcAft>
+                    <a:spcPts val="0"/>
+                  </a:spcAft>
+                  <a:buClrTx/>
+                  <a:buSzTx/>
+                  <a:buFont typeface="Arial" panose="020B0604020202020204" pitchFamily="34" charset="0"/>
+                  <a:buChar char="•"/>
+                  <a:tabLst/>
+                  <a:defRPr/>
+                </a:pPr>
+                <a:endParaRPr kumimoji="0" lang="en-US" sz="1050" b="1" i="0" u="none" strike="noStrike" kern="0" cap="none" spc="0" normalizeH="0" baseline="0" noProof="0">
+                  <a:ln>
+                    <a:noFill/>
+                  </a:ln>
+                  <a:solidFill>
+                    <a:srgbClr val="474749">
+                      <a:lumMod val="95000"/>
+                      <a:lumOff val="5000"/>
+                    </a:srgbClr>
+                  </a:solidFill>
+                  <a:effectLst/>
+                  <a:uLnTx/>
+                  <a:uFillTx/>
+                  <a:latin typeface="Arial" panose="020B0604020202020204"/>
+                </a:endParaRPr>
+              </a:p>
+            </p:txBody>
+          </p:sp>
+          <p:sp>
+            <p:nvSpPr>
+              <p:cNvPr id="61" name="Alternate Process 24">
+                <a:extLst>
+                  <a:ext uri="{FF2B5EF4-FFF2-40B4-BE49-F238E27FC236}">
+                    <a16:creationId xmlns:a16="http://schemas.microsoft.com/office/drawing/2014/main" id="{661D1D2A-FDBB-4625-0F1C-57A2E0585E3A}"/>
+                  </a:ext>
+                </a:extLst>
+              </p:cNvPr>
+              <p:cNvSpPr/>
+              <p:nvPr/>
+            </p:nvSpPr>
+            <p:spPr>
+              <a:xfrm>
+                <a:off x="3779380" y="2227045"/>
+                <a:ext cx="1477904" cy="421278"/>
+              </a:xfrm>
+              <a:prstGeom prst="flowChartAlternateProcess">
+                <a:avLst/>
+              </a:prstGeom>
+              <a:solidFill>
+                <a:srgbClr val="DFD5A9">
+                  <a:lumMod val="75000"/>
+                </a:srgbClr>
+              </a:solidFill>
+              <a:ln w="12700" cap="flat" cmpd="sng" algn="ctr">
+                <a:solidFill>
+                  <a:srgbClr val="DFD5A9">
+                    <a:shade val="50000"/>
+                  </a:srgbClr>
+                </a:solidFill>
+                <a:prstDash val="solid"/>
+                <a:miter lim="800000"/>
+              </a:ln>
+              <a:effectLst/>
+            </p:spPr>
+            <p:txBody>
+              <a:bodyPr rtlCol="0" anchor="ctr"/>
+              <a:lstStyle/>
+              <a:p>
+                <a:pPr marL="0" marR="0" lvl="0" indent="0" algn="ctr" defTabSz="685748" eaLnBrk="1" fontAlgn="auto" latinLnBrk="0" hangingPunct="1">
+                  <a:lnSpc>
+                    <a:spcPct val="100000"/>
+                  </a:lnSpc>
+                  <a:spcBef>
+                    <a:spcPts val="0"/>
+                  </a:spcBef>
+                  <a:spcAft>
+                    <a:spcPts val="0"/>
+                  </a:spcAft>
+                  <a:buClrTx/>
+                  <a:buSzTx/>
+                  <a:buFontTx/>
+                  <a:buNone/>
+                  <a:tabLst/>
+                  <a:defRPr/>
+                </a:pPr>
+                <a:r>
+                  <a:rPr kumimoji="0" lang="en-US" sz="1050" b="0" i="0" u="none" strike="noStrike" kern="0" cap="none" spc="0" normalizeH="0" baseline="0" noProof="0">
+                    <a:ln>
+                      <a:noFill/>
+                    </a:ln>
+                    <a:solidFill>
+                      <a:prstClr val="white"/>
+                    </a:solidFill>
+                    <a:effectLst/>
+                    <a:uLnTx/>
+                    <a:uFillTx/>
+                    <a:latin typeface="Arial" panose="020B0604020202020204"/>
+                  </a:rPr>
+                  <a:t>PCT Organization (Provider)</a:t>
+                </a:r>
+              </a:p>
+            </p:txBody>
+          </p:sp>
+          <p:sp>
+            <p:nvSpPr>
+              <p:cNvPr id="62" name="Alternate Process 29">
+                <a:extLst>
+                  <a:ext uri="{FF2B5EF4-FFF2-40B4-BE49-F238E27FC236}">
+                    <a16:creationId xmlns:a16="http://schemas.microsoft.com/office/drawing/2014/main" id="{70FAF1DD-9F28-2EC4-B02F-3686ECA6EDB8}"/>
+                  </a:ext>
+                </a:extLst>
+              </p:cNvPr>
+              <p:cNvSpPr/>
+              <p:nvPr/>
+            </p:nvSpPr>
+            <p:spPr>
+              <a:xfrm>
+                <a:off x="3779380" y="2734399"/>
+                <a:ext cx="1476834" cy="431075"/>
+              </a:xfrm>
+              <a:prstGeom prst="flowChartAlternateProcess">
+                <a:avLst/>
+              </a:prstGeom>
+              <a:solidFill>
+                <a:srgbClr val="DFD5A9">
+                  <a:lumMod val="75000"/>
+                </a:srgbClr>
+              </a:solidFill>
+              <a:ln w="12700" cap="flat" cmpd="sng" algn="ctr">
+                <a:solidFill>
+                  <a:srgbClr val="DFD5A9">
+                    <a:shade val="50000"/>
+                  </a:srgbClr>
+                </a:solidFill>
+                <a:prstDash val="solid"/>
+                <a:miter lim="800000"/>
+              </a:ln>
+              <a:effectLst/>
+            </p:spPr>
+            <p:txBody>
+              <a:bodyPr rtlCol="0" anchor="ctr"/>
+              <a:lstStyle/>
+              <a:p>
+                <a:pPr marL="0" marR="0" lvl="0" indent="0" algn="ctr" defTabSz="685748" eaLnBrk="1" fontAlgn="auto" latinLnBrk="0" hangingPunct="1">
+                  <a:lnSpc>
+                    <a:spcPct val="100000"/>
+                  </a:lnSpc>
+                  <a:spcBef>
+                    <a:spcPts val="0"/>
+                  </a:spcBef>
+                  <a:spcAft>
+                    <a:spcPts val="0"/>
+                  </a:spcAft>
+                  <a:buClrTx/>
+                  <a:buSzTx/>
+                  <a:buFontTx/>
+                  <a:buNone/>
+                  <a:tabLst/>
+                  <a:defRPr/>
+                </a:pPr>
+                <a:r>
+                  <a:rPr kumimoji="0" lang="en-US" sz="1050" b="0" i="0" u="none" strike="noStrike" kern="0" cap="none" spc="0" normalizeH="0" baseline="0" noProof="0">
+                    <a:ln>
+                      <a:noFill/>
+                    </a:ln>
+                    <a:solidFill>
+                      <a:prstClr val="white"/>
+                    </a:solidFill>
+                    <a:effectLst/>
+                    <a:uLnTx/>
+                    <a:uFillTx/>
+                    <a:latin typeface="Arial" panose="020B0604020202020204"/>
+                  </a:rPr>
+                  <a:t>PCT Practitioner</a:t>
+                </a:r>
+              </a:p>
+            </p:txBody>
+          </p:sp>
+        </p:grpSp>
+        <p:grpSp>
+          <p:nvGrpSpPr>
+            <p:cNvPr id="49" name="Group 48">
+              <a:extLst>
+                <a:ext uri="{FF2B5EF4-FFF2-40B4-BE49-F238E27FC236}">
+                  <a16:creationId xmlns:a16="http://schemas.microsoft.com/office/drawing/2014/main" id="{80EEFE47-AE91-89CC-D0D7-979AB8479987}"/>
+                </a:ext>
+              </a:extLst>
+            </p:cNvPr>
+            <p:cNvGrpSpPr/>
+            <p:nvPr/>
+          </p:nvGrpSpPr>
+          <p:grpSpPr>
+            <a:xfrm>
+              <a:off x="517008" y="2305033"/>
+              <a:ext cx="3666904" cy="1857494"/>
+              <a:chOff x="1053880" y="1891273"/>
+              <a:chExt cx="4337302" cy="2227479"/>
+            </a:xfrm>
+          </p:grpSpPr>
+          <p:sp>
+            <p:nvSpPr>
+              <p:cNvPr id="55" name="Alternate Process 52">
+                <a:extLst>
+                  <a:ext uri="{FF2B5EF4-FFF2-40B4-BE49-F238E27FC236}">
+                    <a16:creationId xmlns:a16="http://schemas.microsoft.com/office/drawing/2014/main" id="{20969BF9-37B3-2AD8-2E3D-17CBEC4B14C9}"/>
+                  </a:ext>
+                </a:extLst>
+              </p:cNvPr>
+              <p:cNvSpPr/>
+              <p:nvPr/>
+            </p:nvSpPr>
+            <p:spPr>
+              <a:xfrm>
+                <a:off x="1053880" y="1891273"/>
+                <a:ext cx="4337302" cy="2227479"/>
+              </a:xfrm>
+              <a:prstGeom prst="flowChartAlternateProcess">
+                <a:avLst/>
+              </a:prstGeom>
+              <a:solidFill>
+                <a:srgbClr val="DFD5A9">
+                  <a:lumMod val="60000"/>
+                  <a:lumOff val="40000"/>
+                </a:srgbClr>
+              </a:solidFill>
+              <a:ln w="38100" cap="flat" cmpd="sng" algn="ctr">
+                <a:solidFill>
+                  <a:srgbClr val="DFD5A9">
+                    <a:shade val="50000"/>
+                  </a:srgbClr>
+                </a:solidFill>
+                <a:prstDash val="sysDash"/>
+                <a:miter lim="800000"/>
+                <a:extLst>
+                  <a:ext uri="{C807C97D-BFC1-408E-A445-0C87EB9F89A2}">
+                    <ask:lineSketchStyleProps xmlns:ask="http://schemas.microsoft.com/office/drawing/2018/sketchyshapes" sd="1219033472">
+                      <a:custGeom>
+                        <a:avLst/>
+                        <a:gdLst>
+                          <a:gd name="connsiteX0" fmla="*/ 0 w 4148222"/>
+                          <a:gd name="connsiteY0" fmla="*/ 312761 h 1876566"/>
+                          <a:gd name="connsiteX1" fmla="*/ 312761 w 4148222"/>
+                          <a:gd name="connsiteY1" fmla="*/ 0 h 1876566"/>
+                          <a:gd name="connsiteX2" fmla="*/ 935105 w 4148222"/>
+                          <a:gd name="connsiteY2" fmla="*/ 0 h 1876566"/>
+                          <a:gd name="connsiteX3" fmla="*/ 1416540 w 4148222"/>
+                          <a:gd name="connsiteY3" fmla="*/ 0 h 1876566"/>
+                          <a:gd name="connsiteX4" fmla="*/ 2003657 w 4148222"/>
+                          <a:gd name="connsiteY4" fmla="*/ 0 h 1876566"/>
+                          <a:gd name="connsiteX5" fmla="*/ 2520320 w 4148222"/>
+                          <a:gd name="connsiteY5" fmla="*/ 0 h 1876566"/>
+                          <a:gd name="connsiteX6" fmla="*/ 3142663 w 4148222"/>
+                          <a:gd name="connsiteY6" fmla="*/ 0 h 1876566"/>
+                          <a:gd name="connsiteX7" fmla="*/ 3835461 w 4148222"/>
+                          <a:gd name="connsiteY7" fmla="*/ 0 h 1876566"/>
+                          <a:gd name="connsiteX8" fmla="*/ 4148222 w 4148222"/>
+                          <a:gd name="connsiteY8" fmla="*/ 312761 h 1876566"/>
+                          <a:gd name="connsiteX9" fmla="*/ 4148222 w 4148222"/>
+                          <a:gd name="connsiteY9" fmla="*/ 938283 h 1876566"/>
+                          <a:gd name="connsiteX10" fmla="*/ 4148222 w 4148222"/>
+                          <a:gd name="connsiteY10" fmla="*/ 1563805 h 1876566"/>
+                          <a:gd name="connsiteX11" fmla="*/ 3835461 w 4148222"/>
+                          <a:gd name="connsiteY11" fmla="*/ 1876566 h 1876566"/>
+                          <a:gd name="connsiteX12" fmla="*/ 3177890 w 4148222"/>
+                          <a:gd name="connsiteY12" fmla="*/ 1876566 h 1876566"/>
+                          <a:gd name="connsiteX13" fmla="*/ 2661228 w 4148222"/>
+                          <a:gd name="connsiteY13" fmla="*/ 1876566 h 1876566"/>
+                          <a:gd name="connsiteX14" fmla="*/ 2179792 w 4148222"/>
+                          <a:gd name="connsiteY14" fmla="*/ 1876566 h 1876566"/>
+                          <a:gd name="connsiteX15" fmla="*/ 1663129 w 4148222"/>
+                          <a:gd name="connsiteY15" fmla="*/ 1876566 h 1876566"/>
+                          <a:gd name="connsiteX16" fmla="*/ 1111240 w 4148222"/>
+                          <a:gd name="connsiteY16" fmla="*/ 1876566 h 1876566"/>
+                          <a:gd name="connsiteX17" fmla="*/ 312761 w 4148222"/>
+                          <a:gd name="connsiteY17" fmla="*/ 1876566 h 1876566"/>
+                          <a:gd name="connsiteX18" fmla="*/ 0 w 4148222"/>
+                          <a:gd name="connsiteY18" fmla="*/ 1563805 h 1876566"/>
+                          <a:gd name="connsiteX19" fmla="*/ 0 w 4148222"/>
+                          <a:gd name="connsiteY19" fmla="*/ 913262 h 1876566"/>
+                          <a:gd name="connsiteX20" fmla="*/ 0 w 4148222"/>
+                          <a:gd name="connsiteY20" fmla="*/ 312761 h 1876566"/>
+                        </a:gdLst>
+                        <a:ahLst/>
+                        <a:cxnLst>
+                          <a:cxn ang="0">
+                            <a:pos x="connsiteX0" y="connsiteY0"/>
+                          </a:cxn>
+                          <a:cxn ang="0">
+                            <a:pos x="connsiteX1" y="connsiteY1"/>
+                          </a:cxn>
+                          <a:cxn ang="0">
+                            <a:pos x="connsiteX2" y="connsiteY2"/>
+                          </a:cxn>
+                          <a:cxn ang="0">
+                            <a:pos x="connsiteX3" y="connsiteY3"/>
+                          </a:cxn>
+                          <a:cxn ang="0">
+                            <a:pos x="connsiteX4" y="connsiteY4"/>
+                          </a:cxn>
+                          <a:cxn ang="0">
+                            <a:pos x="connsiteX5" y="connsiteY5"/>
+                          </a:cxn>
+                          <a:cxn ang="0">
+                            <a:pos x="connsiteX6" y="connsiteY6"/>
+                          </a:cxn>
+                          <a:cxn ang="0">
+                            <a:pos x="connsiteX7" y="connsiteY7"/>
+                          </a:cxn>
+                          <a:cxn ang="0">
+                            <a:pos x="connsiteX8" y="connsiteY8"/>
+                          </a:cxn>
+                          <a:cxn ang="0">
+                            <a:pos x="connsiteX9" y="connsiteY9"/>
+                          </a:cxn>
+                          <a:cxn ang="0">
+                            <a:pos x="connsiteX10" y="connsiteY10"/>
+                          </a:cxn>
+                          <a:cxn ang="0">
+                            <a:pos x="connsiteX11" y="connsiteY11"/>
+                          </a:cxn>
+                          <a:cxn ang="0">
+                            <a:pos x="connsiteX12" y="connsiteY12"/>
+                          </a:cxn>
+                          <a:cxn ang="0">
+                            <a:pos x="connsiteX13" y="connsiteY13"/>
+                          </a:cxn>
+                          <a:cxn ang="0">
+                            <a:pos x="connsiteX14" y="connsiteY14"/>
+                          </a:cxn>
+                          <a:cxn ang="0">
+                            <a:pos x="connsiteX15" y="connsiteY15"/>
+                          </a:cxn>
+                          <a:cxn ang="0">
+                            <a:pos x="connsiteX16" y="connsiteY16"/>
+                          </a:cxn>
+                          <a:cxn ang="0">
+                            <a:pos x="connsiteX17" y="connsiteY17"/>
+                          </a:cxn>
+                          <a:cxn ang="0">
+                            <a:pos x="connsiteX18" y="connsiteY18"/>
+                          </a:cxn>
+                          <a:cxn ang="0">
+                            <a:pos x="connsiteX19" y="connsiteY19"/>
+                          </a:cxn>
+                          <a:cxn ang="0">
+                            <a:pos x="connsiteX20" y="connsiteY20"/>
+                          </a:cxn>
+                        </a:cxnLst>
+                        <a:rect l="l" t="t" r="r" b="b"/>
+                        <a:pathLst>
+                          <a:path w="4148222" h="1876566" fill="none" extrusionOk="0">
+                            <a:moveTo>
+                              <a:pt x="0" y="312761"/>
+                            </a:moveTo>
+                            <a:cubicBezTo>
+                              <a:pt x="5447" y="150812"/>
+                              <a:pt x="121583" y="9727"/>
+                              <a:pt x="312761" y="0"/>
+                            </a:cubicBezTo>
+                            <a:cubicBezTo>
+                              <a:pt x="515762" y="19403"/>
+                              <a:pt x="675124" y="17524"/>
+                              <a:pt x="935105" y="0"/>
+                            </a:cubicBezTo>
+                            <a:cubicBezTo>
+                              <a:pt x="1195086" y="-17524"/>
+                              <a:pt x="1251901" y="13555"/>
+                              <a:pt x="1416540" y="0"/>
+                            </a:cubicBezTo>
+                            <a:cubicBezTo>
+                              <a:pt x="1581179" y="-13555"/>
+                              <a:pt x="1827054" y="-19825"/>
+                              <a:pt x="2003657" y="0"/>
+                            </a:cubicBezTo>
+                            <a:cubicBezTo>
+                              <a:pt x="2180260" y="19825"/>
+                              <a:pt x="2401760" y="-5134"/>
+                              <a:pt x="2520320" y="0"/>
+                            </a:cubicBezTo>
+                            <a:cubicBezTo>
+                              <a:pt x="2638880" y="5134"/>
+                              <a:pt x="2930791" y="-30835"/>
+                              <a:pt x="3142663" y="0"/>
+                            </a:cubicBezTo>
+                            <a:cubicBezTo>
+                              <a:pt x="3354535" y="30835"/>
+                              <a:pt x="3634367" y="-17717"/>
+                              <a:pt x="3835461" y="0"/>
+                            </a:cubicBezTo>
+                            <a:cubicBezTo>
+                              <a:pt x="3996621" y="36082"/>
+                              <a:pt x="4143611" y="125506"/>
+                              <a:pt x="4148222" y="312761"/>
+                            </a:cubicBezTo>
+                            <a:cubicBezTo>
+                              <a:pt x="4123832" y="532411"/>
+                              <a:pt x="4150959" y="723092"/>
+                              <a:pt x="4148222" y="938283"/>
+                            </a:cubicBezTo>
+                            <a:cubicBezTo>
+                              <a:pt x="4145485" y="1153474"/>
+                              <a:pt x="4130315" y="1328415"/>
+                              <a:pt x="4148222" y="1563805"/>
+                            </a:cubicBezTo>
+                            <a:cubicBezTo>
+                              <a:pt x="4140559" y="1740835"/>
+                              <a:pt x="4018425" y="1904287"/>
+                              <a:pt x="3835461" y="1876566"/>
+                            </a:cubicBezTo>
+                            <a:cubicBezTo>
+                              <a:pt x="3692839" y="1878403"/>
+                              <a:pt x="3500945" y="1908911"/>
+                              <a:pt x="3177890" y="1876566"/>
+                            </a:cubicBezTo>
+                            <a:cubicBezTo>
+                              <a:pt x="2854835" y="1844221"/>
+                              <a:pt x="2873635" y="1850766"/>
+                              <a:pt x="2661228" y="1876566"/>
+                            </a:cubicBezTo>
+                            <a:cubicBezTo>
+                              <a:pt x="2448821" y="1902366"/>
+                              <a:pt x="2335782" y="1853617"/>
+                              <a:pt x="2179792" y="1876566"/>
+                            </a:cubicBezTo>
+                            <a:cubicBezTo>
+                              <a:pt x="2023802" y="1899515"/>
+                              <a:pt x="1916795" y="1901333"/>
+                              <a:pt x="1663129" y="1876566"/>
+                            </a:cubicBezTo>
+                            <a:cubicBezTo>
+                              <a:pt x="1409463" y="1851799"/>
+                              <a:pt x="1316374" y="1879065"/>
+                              <a:pt x="1111240" y="1876566"/>
+                            </a:cubicBezTo>
+                            <a:cubicBezTo>
+                              <a:pt x="906106" y="1874067"/>
+                              <a:pt x="649230" y="1914853"/>
+                              <a:pt x="312761" y="1876566"/>
+                            </a:cubicBezTo>
+                            <a:cubicBezTo>
+                              <a:pt x="127444" y="1889058"/>
+                              <a:pt x="27462" y="1742702"/>
+                              <a:pt x="0" y="1563805"/>
+                            </a:cubicBezTo>
+                            <a:cubicBezTo>
+                              <a:pt x="23645" y="1429589"/>
+                              <a:pt x="26200" y="1122235"/>
+                              <a:pt x="0" y="913262"/>
+                            </a:cubicBezTo>
+                            <a:cubicBezTo>
+                              <a:pt x="-26200" y="704289"/>
+                              <a:pt x="-11285" y="445648"/>
+                              <a:pt x="0" y="312761"/>
+                            </a:cubicBezTo>
+                            <a:close/>
+                          </a:path>
+                          <a:path w="4148222" h="1876566" stroke="0" extrusionOk="0">
+                            <a:moveTo>
+                              <a:pt x="0" y="312761"/>
+                            </a:moveTo>
+                            <a:cubicBezTo>
+                              <a:pt x="-35672" y="118024"/>
+                              <a:pt x="118260" y="8170"/>
+                              <a:pt x="312761" y="0"/>
+                            </a:cubicBezTo>
+                            <a:cubicBezTo>
+                              <a:pt x="610023" y="-27692"/>
+                              <a:pt x="688344" y="10336"/>
+                              <a:pt x="970332" y="0"/>
+                            </a:cubicBezTo>
+                            <a:cubicBezTo>
+                              <a:pt x="1252320" y="-10336"/>
+                              <a:pt x="1406577" y="-22665"/>
+                              <a:pt x="1522221" y="0"/>
+                            </a:cubicBezTo>
+                            <a:cubicBezTo>
+                              <a:pt x="1637865" y="22665"/>
+                              <a:pt x="1930372" y="929"/>
+                              <a:pt x="2038884" y="0"/>
+                            </a:cubicBezTo>
+                            <a:cubicBezTo>
+                              <a:pt x="2147396" y="-929"/>
+                              <a:pt x="2487634" y="19222"/>
+                              <a:pt x="2661228" y="0"/>
+                            </a:cubicBezTo>
+                            <a:cubicBezTo>
+                              <a:pt x="2834822" y="-19222"/>
+                              <a:pt x="3089860" y="-24136"/>
+                              <a:pt x="3213117" y="0"/>
+                            </a:cubicBezTo>
+                            <a:cubicBezTo>
+                              <a:pt x="3336374" y="24136"/>
+                              <a:pt x="3554658" y="22469"/>
+                              <a:pt x="3835461" y="0"/>
+                            </a:cubicBezTo>
+                            <a:cubicBezTo>
+                              <a:pt x="4004524" y="-34995"/>
+                              <a:pt x="4129933" y="165445"/>
+                              <a:pt x="4148222" y="312761"/>
+                            </a:cubicBezTo>
+                            <a:cubicBezTo>
+                              <a:pt x="4121221" y="589426"/>
+                              <a:pt x="4171625" y="754499"/>
+                              <a:pt x="4148222" y="913262"/>
+                            </a:cubicBezTo>
+                            <a:cubicBezTo>
+                              <a:pt x="4124819" y="1072025"/>
+                              <a:pt x="4122801" y="1307280"/>
+                              <a:pt x="4148222" y="1563805"/>
+                            </a:cubicBezTo>
+                            <a:cubicBezTo>
+                              <a:pt x="4153448" y="1744318"/>
+                              <a:pt x="4009302" y="1888039"/>
+                              <a:pt x="3835461" y="1876566"/>
+                            </a:cubicBezTo>
+                            <a:cubicBezTo>
+                              <a:pt x="3671403" y="1891255"/>
+                              <a:pt x="3576686" y="1871103"/>
+                              <a:pt x="3354025" y="1876566"/>
+                            </a:cubicBezTo>
+                            <a:cubicBezTo>
+                              <a:pt x="3131364" y="1882029"/>
+                              <a:pt x="2916645" y="1904793"/>
+                              <a:pt x="2696455" y="1876566"/>
+                            </a:cubicBezTo>
+                            <a:cubicBezTo>
+                              <a:pt x="2476265" y="1848340"/>
+                              <a:pt x="2432046" y="1872658"/>
+                              <a:pt x="2179792" y="1876566"/>
+                            </a:cubicBezTo>
+                            <a:cubicBezTo>
+                              <a:pt x="1927538" y="1880474"/>
+                              <a:pt x="1732801" y="1902720"/>
+                              <a:pt x="1592675" y="1876566"/>
+                            </a:cubicBezTo>
+                            <a:cubicBezTo>
+                              <a:pt x="1452549" y="1850412"/>
+                              <a:pt x="1210750" y="1887462"/>
+                              <a:pt x="935105" y="1876566"/>
+                            </a:cubicBezTo>
+                            <a:cubicBezTo>
+                              <a:pt x="659460" y="1865671"/>
+                              <a:pt x="574921" y="1845724"/>
+                              <a:pt x="312761" y="1876566"/>
+                            </a:cubicBezTo>
+                            <a:cubicBezTo>
+                              <a:pt x="126796" y="1900225"/>
+                              <a:pt x="30351" y="1759091"/>
+                              <a:pt x="0" y="1563805"/>
+                            </a:cubicBezTo>
+                            <a:cubicBezTo>
+                              <a:pt x="-17858" y="1349269"/>
+                              <a:pt x="23350" y="1257755"/>
+                              <a:pt x="0" y="963304"/>
+                            </a:cubicBezTo>
+                            <a:cubicBezTo>
+                              <a:pt x="-23350" y="668853"/>
+                              <a:pt x="19740" y="621988"/>
+                              <a:pt x="0" y="312761"/>
+                            </a:cubicBezTo>
+                            <a:close/>
+                          </a:path>
+                        </a:pathLst>
+                      </a:custGeom>
+                      <ask:type>
+                        <ask:lineSketchNone/>
+                      </ask:type>
+                    </ask:lineSketchStyleProps>
+                  </a:ext>
+                </a:extLst>
+              </a:ln>
+              <a:effectLst/>
+            </p:spPr>
+            <p:txBody>
+              <a:bodyPr lIns="0" rIns="0" rtlCol="0" anchor="t" anchorCtr="0"/>
+              <a:lstStyle/>
+              <a:p>
+                <a:pPr marL="0" marR="0" lvl="0" indent="0" defTabSz="685748" eaLnBrk="1" fontAlgn="auto" latinLnBrk="0" hangingPunct="1">
+                  <a:lnSpc>
+                    <a:spcPct val="100000"/>
+                  </a:lnSpc>
+                  <a:spcBef>
+                    <a:spcPts val="0"/>
+                  </a:spcBef>
+                  <a:spcAft>
+                    <a:spcPts val="0"/>
+                  </a:spcAft>
+                  <a:buClrTx/>
+                  <a:buSzTx/>
+                  <a:buFontTx/>
+                  <a:buNone/>
+                  <a:tabLst/>
+                  <a:defRPr/>
+                </a:pPr>
+                <a:endParaRPr kumimoji="0" lang="en-US" sz="1050" b="1" i="0" u="none" strike="noStrike" kern="0" cap="none" spc="0" normalizeH="0" baseline="0" noProof="0">
+                  <a:ln>
+                    <a:noFill/>
+                  </a:ln>
+                  <a:solidFill>
+                    <a:srgbClr val="474749">
+                      <a:lumMod val="95000"/>
+                      <a:lumOff val="5000"/>
+                    </a:srgbClr>
+                  </a:solidFill>
+                  <a:effectLst/>
+                  <a:uLnTx/>
+                  <a:uFillTx/>
+                  <a:latin typeface="Arial" panose="020B0604020202020204"/>
+                </a:endParaRPr>
+              </a:p>
+            </p:txBody>
+          </p:sp>
+          <p:sp>
+            <p:nvSpPr>
+              <p:cNvPr id="56" name="Alternate Process 54">
+                <a:extLst>
+                  <a:ext uri="{FF2B5EF4-FFF2-40B4-BE49-F238E27FC236}">
+                    <a16:creationId xmlns:a16="http://schemas.microsoft.com/office/drawing/2014/main" id="{E27B1335-E41C-ABE6-7EBF-AEA5D647A4D3}"/>
+                  </a:ext>
+                </a:extLst>
+              </p:cNvPr>
+              <p:cNvSpPr/>
+              <p:nvPr/>
+            </p:nvSpPr>
+            <p:spPr>
+              <a:xfrm>
+                <a:off x="1199856" y="2055347"/>
+                <a:ext cx="2473277" cy="1975577"/>
+              </a:xfrm>
+              <a:prstGeom prst="flowChartAlternateProcess">
+                <a:avLst/>
+              </a:prstGeom>
+              <a:solidFill>
+                <a:srgbClr val="ED7D31"/>
+              </a:solidFill>
+              <a:ln w="12700" cap="flat" cmpd="sng" algn="ctr">
+                <a:solidFill>
+                  <a:srgbClr val="DFD5A9">
+                    <a:shade val="50000"/>
+                  </a:srgbClr>
+                </a:solidFill>
+                <a:prstDash val="solid"/>
+                <a:miter lim="800000"/>
+              </a:ln>
+              <a:effectLst/>
+            </p:spPr>
+            <p:txBody>
+              <a:bodyPr lIns="0" rIns="0" rtlCol="0" anchor="t" anchorCtr="0"/>
+              <a:lstStyle/>
+              <a:p>
+                <a:pPr marL="0" marR="0" lvl="0" indent="0" algn="ctr" defTabSz="685748" eaLnBrk="1" fontAlgn="auto" latinLnBrk="0" hangingPunct="1">
+                  <a:lnSpc>
+                    <a:spcPct val="100000"/>
+                  </a:lnSpc>
+                  <a:spcBef>
+                    <a:spcPts val="0"/>
+                  </a:spcBef>
+                  <a:spcAft>
+                    <a:spcPts val="0"/>
+                  </a:spcAft>
+                  <a:buClrTx/>
+                  <a:buSzTx/>
+                  <a:buFontTx/>
+                  <a:buNone/>
+                  <a:tabLst/>
+                  <a:defRPr/>
+                </a:pPr>
+                <a:r>
+                  <a:rPr kumimoji="0" lang="en-US" sz="1050" b="1" i="0" u="none" strike="noStrike" kern="0" cap="none" spc="0" normalizeH="0" baseline="0" noProof="0">
+                    <a:ln>
+                      <a:noFill/>
+                    </a:ln>
+                    <a:solidFill>
+                      <a:srgbClr val="474749">
+                        <a:lumMod val="95000"/>
+                        <a:lumOff val="5000"/>
+                      </a:srgbClr>
+                    </a:solidFill>
+                    <a:effectLst/>
+                    <a:uLnTx/>
+                    <a:uFillTx/>
+                    <a:latin typeface="Arial" panose="020B0604020202020204"/>
+                  </a:rPr>
+                  <a:t>Good Faith Estimate (GFE)</a:t>
+                </a:r>
+              </a:p>
+              <a:p>
+                <a:pPr marL="0" marR="0" lvl="0" indent="0" algn="ctr" defTabSz="685748" eaLnBrk="1" fontAlgn="auto" latinLnBrk="0" hangingPunct="1">
+                  <a:lnSpc>
+                    <a:spcPct val="100000"/>
+                  </a:lnSpc>
+                  <a:spcBef>
+                    <a:spcPts val="0"/>
+                  </a:spcBef>
+                  <a:spcAft>
+                    <a:spcPts val="0"/>
+                  </a:spcAft>
+                  <a:buClrTx/>
+                  <a:buSzTx/>
+                  <a:buFontTx/>
+                  <a:buNone/>
+                  <a:tabLst/>
+                  <a:defRPr/>
+                </a:pPr>
+                <a:endParaRPr kumimoji="0" lang="en-US" sz="1050" b="1" i="0" u="none" strike="noStrike" kern="0" cap="none" spc="0" normalizeH="0" baseline="0" noProof="0">
+                  <a:ln>
+                    <a:noFill/>
+                  </a:ln>
+                  <a:solidFill>
+                    <a:srgbClr val="474749">
+                      <a:lumMod val="95000"/>
+                      <a:lumOff val="5000"/>
+                    </a:srgbClr>
+                  </a:solidFill>
+                  <a:effectLst/>
+                  <a:uLnTx/>
+                  <a:uFillTx/>
+                  <a:latin typeface="Arial" panose="020B0604020202020204"/>
+                </a:endParaRPr>
+              </a:p>
+              <a:p>
+                <a:pPr marL="214313" marR="0" lvl="0" indent="-214313" defTabSz="685748" eaLnBrk="1" fontAlgn="auto" latinLnBrk="0" hangingPunct="1">
+                  <a:lnSpc>
+                    <a:spcPct val="100000"/>
+                  </a:lnSpc>
+                  <a:spcBef>
+                    <a:spcPts val="0"/>
+                  </a:spcBef>
+                  <a:spcAft>
+                    <a:spcPts val="0"/>
+                  </a:spcAft>
+                  <a:buClrTx/>
+                  <a:buSzTx/>
+                  <a:buFont typeface="Arial" panose="020B0604020202020204" pitchFamily="34" charset="0"/>
+                  <a:buChar char="•"/>
+                  <a:tabLst/>
+                  <a:defRPr/>
+                </a:pPr>
+                <a:r>
+                  <a:rPr kumimoji="0" lang="en-US" sz="1050" b="1" i="0" u="none" strike="noStrike" kern="0" cap="none" spc="0" normalizeH="0" baseline="0" noProof="0">
+                    <a:ln>
+                      <a:noFill/>
+                    </a:ln>
+                    <a:solidFill>
+                      <a:srgbClr val="474749">
+                        <a:lumMod val="95000"/>
+                        <a:lumOff val="5000"/>
+                      </a:srgbClr>
+                    </a:solidFill>
+                    <a:effectLst/>
+                    <a:uLnTx/>
+                    <a:uFillTx/>
+                    <a:latin typeface="Arial" panose="020B0604020202020204"/>
+                  </a:rPr>
+                  <a:t>Estimated  Date of Service</a:t>
+                </a:r>
+              </a:p>
+              <a:p>
+                <a:pPr marL="214313" marR="0" lvl="0" indent="-214313" defTabSz="685748" eaLnBrk="1" fontAlgn="auto" latinLnBrk="0" hangingPunct="1">
+                  <a:lnSpc>
+                    <a:spcPct val="100000"/>
+                  </a:lnSpc>
+                  <a:spcBef>
+                    <a:spcPts val="0"/>
+                  </a:spcBef>
+                  <a:spcAft>
+                    <a:spcPts val="0"/>
+                  </a:spcAft>
+                  <a:buClrTx/>
+                  <a:buSzTx/>
+                  <a:buFont typeface="Arial" panose="020B0604020202020204" pitchFamily="34" charset="0"/>
+                  <a:buChar char="•"/>
+                  <a:tabLst/>
+                  <a:defRPr/>
+                </a:pPr>
+                <a:r>
+                  <a:rPr kumimoji="0" lang="en-US" sz="1050" b="1" i="0" u="none" strike="noStrike" kern="0" cap="none" spc="0" normalizeH="0" baseline="0" noProof="0">
+                    <a:ln>
+                      <a:noFill/>
+                    </a:ln>
+                    <a:solidFill>
+                      <a:srgbClr val="474749">
+                        <a:lumMod val="95000"/>
+                        <a:lumOff val="5000"/>
+                      </a:srgbClr>
+                    </a:solidFill>
+                    <a:effectLst/>
+                    <a:uLnTx/>
+                    <a:uFillTx/>
+                    <a:latin typeface="Arial" panose="020B0604020202020204"/>
+                  </a:rPr>
+                  <a:t>Diagnoses/Procedures</a:t>
+                </a:r>
+              </a:p>
+              <a:p>
+                <a:pPr marL="214313" marR="0" lvl="0" indent="-214313" defTabSz="685748" eaLnBrk="1" fontAlgn="auto" latinLnBrk="0" hangingPunct="1">
+                  <a:lnSpc>
+                    <a:spcPct val="100000"/>
+                  </a:lnSpc>
+                  <a:spcBef>
+                    <a:spcPts val="0"/>
+                  </a:spcBef>
+                  <a:spcAft>
+                    <a:spcPts val="0"/>
+                  </a:spcAft>
+                  <a:buClrTx/>
+                  <a:buSzTx/>
+                  <a:buFont typeface="Arial" panose="020B0604020202020204" pitchFamily="34" charset="0"/>
+                  <a:buChar char="•"/>
+                  <a:tabLst/>
+                  <a:defRPr/>
+                </a:pPr>
+                <a:r>
+                  <a:rPr kumimoji="0" lang="en-US" sz="1050" b="1" i="0" u="none" strike="noStrike" kern="0" cap="none" spc="0" normalizeH="0" baseline="0" noProof="0">
+                    <a:ln>
+                      <a:noFill/>
+                    </a:ln>
+                    <a:solidFill>
+                      <a:srgbClr val="474749">
+                        <a:lumMod val="95000"/>
+                        <a:lumOff val="5000"/>
+                      </a:srgbClr>
+                    </a:solidFill>
+                    <a:effectLst/>
+                    <a:uLnTx/>
+                    <a:uFillTx/>
+                    <a:latin typeface="Arial" panose="020B0604020202020204"/>
+                  </a:rPr>
+                  <a:t>Line items</a:t>
+                </a:r>
+              </a:p>
+              <a:p>
+                <a:pPr marL="557213" marR="0" lvl="1" indent="-214313" defTabSz="685748" eaLnBrk="1" fontAlgn="auto" latinLnBrk="0" hangingPunct="1">
+                  <a:lnSpc>
+                    <a:spcPct val="100000"/>
+                  </a:lnSpc>
+                  <a:spcBef>
+                    <a:spcPts val="0"/>
+                  </a:spcBef>
+                  <a:spcAft>
+                    <a:spcPts val="0"/>
+                  </a:spcAft>
+                  <a:buClrTx/>
+                  <a:buSzTx/>
+                  <a:buFont typeface="Arial" panose="020B0604020202020204" pitchFamily="34" charset="0"/>
+                  <a:buChar char="•"/>
+                  <a:tabLst/>
+                  <a:defRPr/>
+                </a:pPr>
+                <a:r>
+                  <a:rPr kumimoji="0" lang="en-US" sz="1050" b="1" i="0" u="none" strike="noStrike" kern="0" cap="none" spc="0" normalizeH="0" baseline="0" noProof="0">
+                    <a:ln>
+                      <a:noFill/>
+                    </a:ln>
+                    <a:solidFill>
+                      <a:srgbClr val="474749">
+                        <a:lumMod val="95000"/>
+                        <a:lumOff val="5000"/>
+                      </a:srgbClr>
+                    </a:solidFill>
+                    <a:effectLst/>
+                    <a:uLnTx/>
+                    <a:uFillTx/>
+                    <a:latin typeface="Arial" panose="020B0604020202020204"/>
+                  </a:rPr>
+                  <a:t>Product/Service</a:t>
+                </a:r>
+              </a:p>
+              <a:p>
+                <a:pPr marL="557213" marR="0" lvl="1" indent="-214313" defTabSz="685748" eaLnBrk="1" fontAlgn="auto" latinLnBrk="0" hangingPunct="1">
+                  <a:lnSpc>
+                    <a:spcPct val="100000"/>
+                  </a:lnSpc>
+                  <a:spcBef>
+                    <a:spcPts val="0"/>
+                  </a:spcBef>
+                  <a:spcAft>
+                    <a:spcPts val="0"/>
+                  </a:spcAft>
+                  <a:buClrTx/>
+                  <a:buSzTx/>
+                  <a:buFont typeface="Arial" panose="020B0604020202020204" pitchFamily="34" charset="0"/>
+                  <a:buChar char="•"/>
+                  <a:tabLst/>
+                  <a:defRPr/>
+                </a:pPr>
+                <a:r>
+                  <a:rPr kumimoji="0" lang="en-US" sz="1050" b="1" i="0" u="none" strike="noStrike" kern="0" cap="none" spc="0" normalizeH="0" baseline="0" noProof="0">
+                    <a:ln>
+                      <a:noFill/>
+                    </a:ln>
+                    <a:solidFill>
+                      <a:srgbClr val="474749">
+                        <a:lumMod val="95000"/>
+                        <a:lumOff val="5000"/>
+                      </a:srgbClr>
+                    </a:solidFill>
+                    <a:effectLst/>
+                    <a:uLnTx/>
+                    <a:uFillTx/>
+                    <a:latin typeface="Arial" panose="020B0604020202020204"/>
+                  </a:rPr>
+                  <a:t>Quantity/Price</a:t>
+                </a:r>
+              </a:p>
+              <a:p>
+                <a:pPr marL="214313" marR="0" lvl="0" indent="-214313" defTabSz="685748" eaLnBrk="1" fontAlgn="auto" latinLnBrk="0" hangingPunct="1">
+                  <a:lnSpc>
+                    <a:spcPct val="100000"/>
+                  </a:lnSpc>
+                  <a:spcBef>
+                    <a:spcPts val="0"/>
+                  </a:spcBef>
+                  <a:spcAft>
+                    <a:spcPts val="0"/>
+                  </a:spcAft>
+                  <a:buClrTx/>
+                  <a:buSzTx/>
+                  <a:buFont typeface="Arial" panose="020B0604020202020204" pitchFamily="34" charset="0"/>
+                  <a:buChar char="•"/>
+                  <a:tabLst/>
+                  <a:defRPr/>
+                </a:pPr>
+                <a:r>
+                  <a:rPr kumimoji="0" lang="en-US" sz="1050" b="1" i="0" u="none" strike="noStrike" kern="0" cap="none" spc="0" normalizeH="0" baseline="0" noProof="0">
+                    <a:ln>
+                      <a:noFill/>
+                    </a:ln>
+                    <a:solidFill>
+                      <a:srgbClr val="474749">
+                        <a:lumMod val="95000"/>
+                        <a:lumOff val="5000"/>
+                      </a:srgbClr>
+                    </a:solidFill>
+                    <a:effectLst/>
+                    <a:uLnTx/>
+                    <a:uFillTx/>
+                    <a:latin typeface="Arial" panose="020B0604020202020204"/>
+                  </a:rPr>
+                  <a:t>Total</a:t>
+                </a:r>
+              </a:p>
+              <a:p>
+                <a:pPr marL="214313" marR="0" lvl="0" indent="-214313" defTabSz="685748" eaLnBrk="1" fontAlgn="auto" latinLnBrk="0" hangingPunct="1">
+                  <a:lnSpc>
+                    <a:spcPct val="100000"/>
+                  </a:lnSpc>
+                  <a:spcBef>
+                    <a:spcPts val="0"/>
+                  </a:spcBef>
+                  <a:spcAft>
+                    <a:spcPts val="0"/>
+                  </a:spcAft>
+                  <a:buClrTx/>
+                  <a:buSzTx/>
+                  <a:buFont typeface="Arial" panose="020B0604020202020204" pitchFamily="34" charset="0"/>
+                  <a:buChar char="•"/>
+                  <a:tabLst/>
+                  <a:defRPr/>
+                </a:pPr>
+                <a:endParaRPr kumimoji="0" lang="en-US" sz="1050" b="1" i="0" u="none" strike="noStrike" kern="0" cap="none" spc="0" normalizeH="0" baseline="0" noProof="0">
+                  <a:ln>
+                    <a:noFill/>
+                  </a:ln>
+                  <a:solidFill>
+                    <a:srgbClr val="474749">
+                      <a:lumMod val="95000"/>
+                      <a:lumOff val="5000"/>
+                    </a:srgbClr>
+                  </a:solidFill>
+                  <a:effectLst/>
+                  <a:uLnTx/>
+                  <a:uFillTx/>
+                  <a:latin typeface="Arial" panose="020B0604020202020204"/>
+                </a:endParaRPr>
+              </a:p>
+              <a:p>
+                <a:pPr marL="214313" marR="0" lvl="0" indent="-214313" defTabSz="685748" eaLnBrk="1" fontAlgn="auto" latinLnBrk="0" hangingPunct="1">
+                  <a:lnSpc>
+                    <a:spcPct val="100000"/>
+                  </a:lnSpc>
+                  <a:spcBef>
+                    <a:spcPts val="0"/>
+                  </a:spcBef>
+                  <a:spcAft>
+                    <a:spcPts val="0"/>
+                  </a:spcAft>
+                  <a:buClrTx/>
+                  <a:buSzTx/>
+                  <a:buFont typeface="Arial" panose="020B0604020202020204" pitchFamily="34" charset="0"/>
+                  <a:buChar char="•"/>
+                  <a:tabLst/>
+                  <a:defRPr/>
+                </a:pPr>
+                <a:endParaRPr kumimoji="0" lang="en-US" sz="1050" b="1" i="0" u="none" strike="noStrike" kern="0" cap="none" spc="0" normalizeH="0" baseline="0" noProof="0">
+                  <a:ln>
+                    <a:noFill/>
+                  </a:ln>
+                  <a:solidFill>
+                    <a:srgbClr val="474749">
+                      <a:lumMod val="95000"/>
+                      <a:lumOff val="5000"/>
+                    </a:srgbClr>
+                  </a:solidFill>
+                  <a:effectLst/>
+                  <a:uLnTx/>
+                  <a:uFillTx/>
+                  <a:latin typeface="Arial" panose="020B0604020202020204"/>
+                </a:endParaRPr>
+              </a:p>
+            </p:txBody>
+          </p:sp>
+          <p:sp>
+            <p:nvSpPr>
+              <p:cNvPr id="57" name="Alternate Process 55">
+                <a:extLst>
+                  <a:ext uri="{FF2B5EF4-FFF2-40B4-BE49-F238E27FC236}">
+                    <a16:creationId xmlns:a16="http://schemas.microsoft.com/office/drawing/2014/main" id="{4B9DE0C4-5D2E-AB3E-A685-1C9F2E1A86E8}"/>
+                  </a:ext>
+                </a:extLst>
+              </p:cNvPr>
+              <p:cNvSpPr/>
+              <p:nvPr/>
+            </p:nvSpPr>
+            <p:spPr>
+              <a:xfrm>
+                <a:off x="3779380" y="2227045"/>
+                <a:ext cx="1477904" cy="421278"/>
+              </a:xfrm>
+              <a:prstGeom prst="flowChartAlternateProcess">
+                <a:avLst/>
+              </a:prstGeom>
+              <a:solidFill>
+                <a:srgbClr val="DFD5A9">
+                  <a:lumMod val="75000"/>
+                </a:srgbClr>
+              </a:solidFill>
+              <a:ln w="12700" cap="flat" cmpd="sng" algn="ctr">
+                <a:solidFill>
+                  <a:srgbClr val="DFD5A9">
+                    <a:shade val="50000"/>
+                  </a:srgbClr>
+                </a:solidFill>
+                <a:prstDash val="solid"/>
+                <a:miter lim="800000"/>
+              </a:ln>
+              <a:effectLst/>
+            </p:spPr>
+            <p:txBody>
+              <a:bodyPr rtlCol="0" anchor="ctr"/>
+              <a:lstStyle/>
+              <a:p>
+                <a:pPr marL="0" marR="0" lvl="0" indent="0" algn="ctr" defTabSz="685748" eaLnBrk="1" fontAlgn="auto" latinLnBrk="0" hangingPunct="1">
+                  <a:lnSpc>
+                    <a:spcPct val="100000"/>
+                  </a:lnSpc>
+                  <a:spcBef>
+                    <a:spcPts val="0"/>
+                  </a:spcBef>
+                  <a:spcAft>
+                    <a:spcPts val="0"/>
+                  </a:spcAft>
+                  <a:buClrTx/>
+                  <a:buSzTx/>
+                  <a:buFontTx/>
+                  <a:buNone/>
+                  <a:tabLst/>
+                  <a:defRPr/>
+                </a:pPr>
+                <a:r>
+                  <a:rPr kumimoji="0" lang="en-US" sz="1050" b="0" i="0" u="none" strike="noStrike" kern="0" cap="none" spc="0" normalizeH="0" baseline="0" noProof="0">
+                    <a:ln>
+                      <a:noFill/>
+                    </a:ln>
+                    <a:solidFill>
+                      <a:prstClr val="white"/>
+                    </a:solidFill>
+                    <a:effectLst/>
+                    <a:uLnTx/>
+                    <a:uFillTx/>
+                    <a:latin typeface="Arial" panose="020B0604020202020204"/>
+                  </a:rPr>
+                  <a:t>PCT Organization (Provider)</a:t>
+                </a:r>
+              </a:p>
+            </p:txBody>
+          </p:sp>
+          <p:sp>
+            <p:nvSpPr>
+              <p:cNvPr id="58" name="Alternate Process 56">
+                <a:extLst>
+                  <a:ext uri="{FF2B5EF4-FFF2-40B4-BE49-F238E27FC236}">
+                    <a16:creationId xmlns:a16="http://schemas.microsoft.com/office/drawing/2014/main" id="{E1E2ADF3-67A7-7AB6-2EF2-62B74A8A0C4F}"/>
+                  </a:ext>
+                </a:extLst>
+              </p:cNvPr>
+              <p:cNvSpPr/>
+              <p:nvPr/>
+            </p:nvSpPr>
+            <p:spPr>
+              <a:xfrm>
+                <a:off x="3779380" y="2734399"/>
+                <a:ext cx="1476834" cy="431075"/>
+              </a:xfrm>
+              <a:prstGeom prst="flowChartAlternateProcess">
+                <a:avLst/>
+              </a:prstGeom>
+              <a:solidFill>
+                <a:srgbClr val="DFD5A9">
+                  <a:lumMod val="75000"/>
+                </a:srgbClr>
+              </a:solidFill>
+              <a:ln w="12700" cap="flat" cmpd="sng" algn="ctr">
+                <a:solidFill>
+                  <a:srgbClr val="DFD5A9">
+                    <a:shade val="50000"/>
+                  </a:srgbClr>
+                </a:solidFill>
+                <a:prstDash val="solid"/>
+                <a:miter lim="800000"/>
+              </a:ln>
+              <a:effectLst/>
+            </p:spPr>
+            <p:txBody>
+              <a:bodyPr rtlCol="0" anchor="ctr"/>
+              <a:lstStyle/>
+              <a:p>
+                <a:pPr marL="0" marR="0" lvl="0" indent="0" algn="ctr" defTabSz="685748" eaLnBrk="1" fontAlgn="auto" latinLnBrk="0" hangingPunct="1">
+                  <a:lnSpc>
+                    <a:spcPct val="100000"/>
+                  </a:lnSpc>
+                  <a:spcBef>
+                    <a:spcPts val="0"/>
+                  </a:spcBef>
+                  <a:spcAft>
+                    <a:spcPts val="0"/>
+                  </a:spcAft>
+                  <a:buClrTx/>
+                  <a:buSzTx/>
+                  <a:buFontTx/>
+                  <a:buNone/>
+                  <a:tabLst/>
+                  <a:defRPr/>
+                </a:pPr>
+                <a:r>
+                  <a:rPr kumimoji="0" lang="en-US" sz="1050" b="0" i="0" u="none" strike="noStrike" kern="0" cap="none" spc="0" normalizeH="0" baseline="0" noProof="0">
+                    <a:ln>
+                      <a:noFill/>
+                    </a:ln>
+                    <a:solidFill>
+                      <a:prstClr val="white"/>
+                    </a:solidFill>
+                    <a:effectLst/>
+                    <a:uLnTx/>
+                    <a:uFillTx/>
+                    <a:latin typeface="Arial" panose="020B0604020202020204"/>
+                  </a:rPr>
+                  <a:t>PCT Practitioner</a:t>
+                </a:r>
+              </a:p>
+            </p:txBody>
+          </p:sp>
+        </p:grpSp>
+        <p:grpSp>
+          <p:nvGrpSpPr>
+            <p:cNvPr id="50" name="Group 49">
+              <a:extLst>
+                <a:ext uri="{FF2B5EF4-FFF2-40B4-BE49-F238E27FC236}">
+                  <a16:creationId xmlns:a16="http://schemas.microsoft.com/office/drawing/2014/main" id="{7079C92A-DFA3-B5BD-BC7A-10905019CEDB}"/>
+                </a:ext>
+              </a:extLst>
+            </p:cNvPr>
+            <p:cNvGrpSpPr/>
+            <p:nvPr/>
+          </p:nvGrpSpPr>
+          <p:grpSpPr>
+            <a:xfrm>
+              <a:off x="631308" y="2419333"/>
+              <a:ext cx="3666904" cy="1857494"/>
+              <a:chOff x="1053880" y="1891273"/>
+              <a:chExt cx="4337302" cy="2227479"/>
+            </a:xfrm>
+          </p:grpSpPr>
+          <p:sp>
+            <p:nvSpPr>
+              <p:cNvPr id="51" name="Alternate Process 58">
+                <a:extLst>
+                  <a:ext uri="{FF2B5EF4-FFF2-40B4-BE49-F238E27FC236}">
+                    <a16:creationId xmlns:a16="http://schemas.microsoft.com/office/drawing/2014/main" id="{2716E998-A69F-FAAE-5174-C86EB0440A9C}"/>
+                  </a:ext>
+                </a:extLst>
+              </p:cNvPr>
+              <p:cNvSpPr/>
+              <p:nvPr/>
+            </p:nvSpPr>
+            <p:spPr>
+              <a:xfrm>
+                <a:off x="1053880" y="1891273"/>
+                <a:ext cx="4337302" cy="2227479"/>
+              </a:xfrm>
+              <a:prstGeom prst="flowChartAlternateProcess">
+                <a:avLst/>
+              </a:prstGeom>
+              <a:solidFill>
+                <a:srgbClr val="DFD5A9">
+                  <a:lumMod val="60000"/>
+                  <a:lumOff val="40000"/>
+                </a:srgbClr>
+              </a:solidFill>
+              <a:ln w="38100" cap="flat" cmpd="sng" algn="ctr">
+                <a:solidFill>
+                  <a:srgbClr val="DFD5A9">
+                    <a:shade val="50000"/>
+                  </a:srgbClr>
+                </a:solidFill>
+                <a:prstDash val="sysDash"/>
+                <a:miter lim="800000"/>
+                <a:extLst>
+                  <a:ext uri="{C807C97D-BFC1-408E-A445-0C87EB9F89A2}">
+                    <ask:lineSketchStyleProps xmlns:ask="http://schemas.microsoft.com/office/drawing/2018/sketchyshapes" sd="1219033472">
+                      <a:custGeom>
+                        <a:avLst/>
+                        <a:gdLst>
+                          <a:gd name="connsiteX0" fmla="*/ 0 w 4148222"/>
+                          <a:gd name="connsiteY0" fmla="*/ 312761 h 1876566"/>
+                          <a:gd name="connsiteX1" fmla="*/ 312761 w 4148222"/>
+                          <a:gd name="connsiteY1" fmla="*/ 0 h 1876566"/>
+                          <a:gd name="connsiteX2" fmla="*/ 935105 w 4148222"/>
+                          <a:gd name="connsiteY2" fmla="*/ 0 h 1876566"/>
+                          <a:gd name="connsiteX3" fmla="*/ 1416540 w 4148222"/>
+                          <a:gd name="connsiteY3" fmla="*/ 0 h 1876566"/>
+                          <a:gd name="connsiteX4" fmla="*/ 2003657 w 4148222"/>
+                          <a:gd name="connsiteY4" fmla="*/ 0 h 1876566"/>
+                          <a:gd name="connsiteX5" fmla="*/ 2520320 w 4148222"/>
+                          <a:gd name="connsiteY5" fmla="*/ 0 h 1876566"/>
+                          <a:gd name="connsiteX6" fmla="*/ 3142663 w 4148222"/>
+                          <a:gd name="connsiteY6" fmla="*/ 0 h 1876566"/>
+                          <a:gd name="connsiteX7" fmla="*/ 3835461 w 4148222"/>
+                          <a:gd name="connsiteY7" fmla="*/ 0 h 1876566"/>
+                          <a:gd name="connsiteX8" fmla="*/ 4148222 w 4148222"/>
+                          <a:gd name="connsiteY8" fmla="*/ 312761 h 1876566"/>
+                          <a:gd name="connsiteX9" fmla="*/ 4148222 w 4148222"/>
+                          <a:gd name="connsiteY9" fmla="*/ 938283 h 1876566"/>
+                          <a:gd name="connsiteX10" fmla="*/ 4148222 w 4148222"/>
+                          <a:gd name="connsiteY10" fmla="*/ 1563805 h 1876566"/>
+                          <a:gd name="connsiteX11" fmla="*/ 3835461 w 4148222"/>
+                          <a:gd name="connsiteY11" fmla="*/ 1876566 h 1876566"/>
+                          <a:gd name="connsiteX12" fmla="*/ 3177890 w 4148222"/>
+                          <a:gd name="connsiteY12" fmla="*/ 1876566 h 1876566"/>
+                          <a:gd name="connsiteX13" fmla="*/ 2661228 w 4148222"/>
+                          <a:gd name="connsiteY13" fmla="*/ 1876566 h 1876566"/>
+                          <a:gd name="connsiteX14" fmla="*/ 2179792 w 4148222"/>
+                          <a:gd name="connsiteY14" fmla="*/ 1876566 h 1876566"/>
+                          <a:gd name="connsiteX15" fmla="*/ 1663129 w 4148222"/>
+                          <a:gd name="connsiteY15" fmla="*/ 1876566 h 1876566"/>
+                          <a:gd name="connsiteX16" fmla="*/ 1111240 w 4148222"/>
+                          <a:gd name="connsiteY16" fmla="*/ 1876566 h 1876566"/>
+                          <a:gd name="connsiteX17" fmla="*/ 312761 w 4148222"/>
+                          <a:gd name="connsiteY17" fmla="*/ 1876566 h 1876566"/>
+                          <a:gd name="connsiteX18" fmla="*/ 0 w 4148222"/>
+                          <a:gd name="connsiteY18" fmla="*/ 1563805 h 1876566"/>
+                          <a:gd name="connsiteX19" fmla="*/ 0 w 4148222"/>
+                          <a:gd name="connsiteY19" fmla="*/ 913262 h 1876566"/>
+                          <a:gd name="connsiteX20" fmla="*/ 0 w 4148222"/>
+                          <a:gd name="connsiteY20" fmla="*/ 312761 h 1876566"/>
+                        </a:gdLst>
+                        <a:ahLst/>
+                        <a:cxnLst>
+                          <a:cxn ang="0">
+                            <a:pos x="connsiteX0" y="connsiteY0"/>
+                          </a:cxn>
+                          <a:cxn ang="0">
+                            <a:pos x="connsiteX1" y="connsiteY1"/>
+                          </a:cxn>
+                          <a:cxn ang="0">
+                            <a:pos x="connsiteX2" y="connsiteY2"/>
+                          </a:cxn>
+                          <a:cxn ang="0">
+                            <a:pos x="connsiteX3" y="connsiteY3"/>
+                          </a:cxn>
+                          <a:cxn ang="0">
+                            <a:pos x="connsiteX4" y="connsiteY4"/>
+                          </a:cxn>
+                          <a:cxn ang="0">
+                            <a:pos x="connsiteX5" y="connsiteY5"/>
+                          </a:cxn>
+                          <a:cxn ang="0">
+                            <a:pos x="connsiteX6" y="connsiteY6"/>
+                          </a:cxn>
+                          <a:cxn ang="0">
+                            <a:pos x="connsiteX7" y="connsiteY7"/>
+                          </a:cxn>
+                          <a:cxn ang="0">
+                            <a:pos x="connsiteX8" y="connsiteY8"/>
+                          </a:cxn>
+                          <a:cxn ang="0">
+                            <a:pos x="connsiteX9" y="connsiteY9"/>
+                          </a:cxn>
+                          <a:cxn ang="0">
+                            <a:pos x="connsiteX10" y="connsiteY10"/>
+                          </a:cxn>
+                          <a:cxn ang="0">
+                            <a:pos x="connsiteX11" y="connsiteY11"/>
+                          </a:cxn>
+                          <a:cxn ang="0">
+                            <a:pos x="connsiteX12" y="connsiteY12"/>
+                          </a:cxn>
+                          <a:cxn ang="0">
+                            <a:pos x="connsiteX13" y="connsiteY13"/>
+                          </a:cxn>
+                          <a:cxn ang="0">
+                            <a:pos x="connsiteX14" y="connsiteY14"/>
+                          </a:cxn>
+                          <a:cxn ang="0">
+                            <a:pos x="connsiteX15" y="connsiteY15"/>
+                          </a:cxn>
+                          <a:cxn ang="0">
+                            <a:pos x="connsiteX16" y="connsiteY16"/>
+                          </a:cxn>
+                          <a:cxn ang="0">
+                            <a:pos x="connsiteX17" y="connsiteY17"/>
+                          </a:cxn>
+                          <a:cxn ang="0">
+                            <a:pos x="connsiteX18" y="connsiteY18"/>
+                          </a:cxn>
+                          <a:cxn ang="0">
+                            <a:pos x="connsiteX19" y="connsiteY19"/>
+                          </a:cxn>
+                          <a:cxn ang="0">
+                            <a:pos x="connsiteX20" y="connsiteY20"/>
+                          </a:cxn>
+                        </a:cxnLst>
+                        <a:rect l="l" t="t" r="r" b="b"/>
+                        <a:pathLst>
+                          <a:path w="4148222" h="1876566" fill="none" extrusionOk="0">
+                            <a:moveTo>
+                              <a:pt x="0" y="312761"/>
+                            </a:moveTo>
+                            <a:cubicBezTo>
+                              <a:pt x="5447" y="150812"/>
+                              <a:pt x="121583" y="9727"/>
+                              <a:pt x="312761" y="0"/>
+                            </a:cubicBezTo>
+                            <a:cubicBezTo>
+                              <a:pt x="515762" y="19403"/>
+                              <a:pt x="675124" y="17524"/>
+                              <a:pt x="935105" y="0"/>
+                            </a:cubicBezTo>
+                            <a:cubicBezTo>
+                              <a:pt x="1195086" y="-17524"/>
+                              <a:pt x="1251901" y="13555"/>
+                              <a:pt x="1416540" y="0"/>
+                            </a:cubicBezTo>
+                            <a:cubicBezTo>
+                              <a:pt x="1581179" y="-13555"/>
+                              <a:pt x="1827054" y="-19825"/>
+                              <a:pt x="2003657" y="0"/>
+                            </a:cubicBezTo>
+                            <a:cubicBezTo>
+                              <a:pt x="2180260" y="19825"/>
+                              <a:pt x="2401760" y="-5134"/>
+                              <a:pt x="2520320" y="0"/>
+                            </a:cubicBezTo>
+                            <a:cubicBezTo>
+                              <a:pt x="2638880" y="5134"/>
+                              <a:pt x="2930791" y="-30835"/>
+                              <a:pt x="3142663" y="0"/>
+                            </a:cubicBezTo>
+                            <a:cubicBezTo>
+                              <a:pt x="3354535" y="30835"/>
+                              <a:pt x="3634367" y="-17717"/>
+                              <a:pt x="3835461" y="0"/>
+                            </a:cubicBezTo>
+                            <a:cubicBezTo>
+                              <a:pt x="3996621" y="36082"/>
+                              <a:pt x="4143611" y="125506"/>
+                              <a:pt x="4148222" y="312761"/>
+                            </a:cubicBezTo>
+                            <a:cubicBezTo>
+                              <a:pt x="4123832" y="532411"/>
+                              <a:pt x="4150959" y="723092"/>
+                              <a:pt x="4148222" y="938283"/>
+                            </a:cubicBezTo>
+                            <a:cubicBezTo>
+                              <a:pt x="4145485" y="1153474"/>
+                              <a:pt x="4130315" y="1328415"/>
+                              <a:pt x="4148222" y="1563805"/>
+                            </a:cubicBezTo>
+                            <a:cubicBezTo>
+                              <a:pt x="4140559" y="1740835"/>
+                              <a:pt x="4018425" y="1904287"/>
+                              <a:pt x="3835461" y="1876566"/>
+                            </a:cubicBezTo>
+                            <a:cubicBezTo>
+                              <a:pt x="3692839" y="1878403"/>
+                              <a:pt x="3500945" y="1908911"/>
+                              <a:pt x="3177890" y="1876566"/>
+                            </a:cubicBezTo>
+                            <a:cubicBezTo>
+                              <a:pt x="2854835" y="1844221"/>
+                              <a:pt x="2873635" y="1850766"/>
+                              <a:pt x="2661228" y="1876566"/>
+                            </a:cubicBezTo>
+                            <a:cubicBezTo>
+                              <a:pt x="2448821" y="1902366"/>
+                              <a:pt x="2335782" y="1853617"/>
+                              <a:pt x="2179792" y="1876566"/>
+                            </a:cubicBezTo>
+                            <a:cubicBezTo>
+                              <a:pt x="2023802" y="1899515"/>
+                              <a:pt x="1916795" y="1901333"/>
+                              <a:pt x="1663129" y="1876566"/>
+                            </a:cubicBezTo>
+                            <a:cubicBezTo>
+                              <a:pt x="1409463" y="1851799"/>
+                              <a:pt x="1316374" y="1879065"/>
+                              <a:pt x="1111240" y="1876566"/>
+                            </a:cubicBezTo>
+                            <a:cubicBezTo>
+                              <a:pt x="906106" y="1874067"/>
+                              <a:pt x="649230" y="1914853"/>
+                              <a:pt x="312761" y="1876566"/>
+                            </a:cubicBezTo>
+                            <a:cubicBezTo>
+                              <a:pt x="127444" y="1889058"/>
+                              <a:pt x="27462" y="1742702"/>
+                              <a:pt x="0" y="1563805"/>
+                            </a:cubicBezTo>
+                            <a:cubicBezTo>
+                              <a:pt x="23645" y="1429589"/>
+                              <a:pt x="26200" y="1122235"/>
+                              <a:pt x="0" y="913262"/>
+                            </a:cubicBezTo>
+                            <a:cubicBezTo>
+                              <a:pt x="-26200" y="704289"/>
+                              <a:pt x="-11285" y="445648"/>
+                              <a:pt x="0" y="312761"/>
+                            </a:cubicBezTo>
+                            <a:close/>
+                          </a:path>
+                          <a:path w="4148222" h="1876566" stroke="0" extrusionOk="0">
+                            <a:moveTo>
+                              <a:pt x="0" y="312761"/>
+                            </a:moveTo>
+                            <a:cubicBezTo>
+                              <a:pt x="-35672" y="118024"/>
+                              <a:pt x="118260" y="8170"/>
+                              <a:pt x="312761" y="0"/>
+                            </a:cubicBezTo>
+                            <a:cubicBezTo>
+                              <a:pt x="610023" y="-27692"/>
+                              <a:pt x="688344" y="10336"/>
+                              <a:pt x="970332" y="0"/>
+                            </a:cubicBezTo>
+                            <a:cubicBezTo>
+                              <a:pt x="1252320" y="-10336"/>
+                              <a:pt x="1406577" y="-22665"/>
+                              <a:pt x="1522221" y="0"/>
+                            </a:cubicBezTo>
+                            <a:cubicBezTo>
+                              <a:pt x="1637865" y="22665"/>
+                              <a:pt x="1930372" y="929"/>
+                              <a:pt x="2038884" y="0"/>
+                            </a:cubicBezTo>
+                            <a:cubicBezTo>
+                              <a:pt x="2147396" y="-929"/>
+                              <a:pt x="2487634" y="19222"/>
+                              <a:pt x="2661228" y="0"/>
+                            </a:cubicBezTo>
+                            <a:cubicBezTo>
+                              <a:pt x="2834822" y="-19222"/>
+                              <a:pt x="3089860" y="-24136"/>
+                              <a:pt x="3213117" y="0"/>
+                            </a:cubicBezTo>
+                            <a:cubicBezTo>
+                              <a:pt x="3336374" y="24136"/>
+                              <a:pt x="3554658" y="22469"/>
+                              <a:pt x="3835461" y="0"/>
+                            </a:cubicBezTo>
+                            <a:cubicBezTo>
+                              <a:pt x="4004524" y="-34995"/>
+                              <a:pt x="4129933" y="165445"/>
+                              <a:pt x="4148222" y="312761"/>
+                            </a:cubicBezTo>
+                            <a:cubicBezTo>
+                              <a:pt x="4121221" y="589426"/>
+                              <a:pt x="4171625" y="754499"/>
+                              <a:pt x="4148222" y="913262"/>
+                            </a:cubicBezTo>
+                            <a:cubicBezTo>
+                              <a:pt x="4124819" y="1072025"/>
+                              <a:pt x="4122801" y="1307280"/>
+                              <a:pt x="4148222" y="1563805"/>
+                            </a:cubicBezTo>
+                            <a:cubicBezTo>
+                              <a:pt x="4153448" y="1744318"/>
+                              <a:pt x="4009302" y="1888039"/>
+                              <a:pt x="3835461" y="1876566"/>
+                            </a:cubicBezTo>
+                            <a:cubicBezTo>
+                              <a:pt x="3671403" y="1891255"/>
+                              <a:pt x="3576686" y="1871103"/>
+                              <a:pt x="3354025" y="1876566"/>
+                            </a:cubicBezTo>
+                            <a:cubicBezTo>
+                              <a:pt x="3131364" y="1882029"/>
+                              <a:pt x="2916645" y="1904793"/>
+                              <a:pt x="2696455" y="1876566"/>
+                            </a:cubicBezTo>
+                            <a:cubicBezTo>
+                              <a:pt x="2476265" y="1848340"/>
+                              <a:pt x="2432046" y="1872658"/>
+                              <a:pt x="2179792" y="1876566"/>
+                            </a:cubicBezTo>
+                            <a:cubicBezTo>
+                              <a:pt x="1927538" y="1880474"/>
+                              <a:pt x="1732801" y="1902720"/>
+                              <a:pt x="1592675" y="1876566"/>
+                            </a:cubicBezTo>
+                            <a:cubicBezTo>
+                              <a:pt x="1452549" y="1850412"/>
+                              <a:pt x="1210750" y="1887462"/>
+                              <a:pt x="935105" y="1876566"/>
+                            </a:cubicBezTo>
+                            <a:cubicBezTo>
+                              <a:pt x="659460" y="1865671"/>
+                              <a:pt x="574921" y="1845724"/>
+                              <a:pt x="312761" y="1876566"/>
+                            </a:cubicBezTo>
+                            <a:cubicBezTo>
+                              <a:pt x="126796" y="1900225"/>
+                              <a:pt x="30351" y="1759091"/>
+                              <a:pt x="0" y="1563805"/>
+                            </a:cubicBezTo>
+                            <a:cubicBezTo>
+                              <a:pt x="-17858" y="1349269"/>
+                              <a:pt x="23350" y="1257755"/>
+                              <a:pt x="0" y="963304"/>
+                            </a:cubicBezTo>
+                            <a:cubicBezTo>
+                              <a:pt x="-23350" y="668853"/>
+                              <a:pt x="19740" y="621988"/>
+                              <a:pt x="0" y="312761"/>
+                            </a:cubicBezTo>
+                            <a:close/>
+                          </a:path>
+                        </a:pathLst>
+                      </a:custGeom>
+                      <ask:type>
+                        <ask:lineSketchNone/>
+                      </ask:type>
+                    </ask:lineSketchStyleProps>
+                  </a:ext>
+                </a:extLst>
+              </a:ln>
+              <a:effectLst/>
+            </p:spPr>
+            <p:txBody>
+              <a:bodyPr lIns="0" rIns="0" rtlCol="0" anchor="t" anchorCtr="0"/>
+              <a:lstStyle/>
+              <a:p>
+                <a:pPr marL="0" marR="0" lvl="0" indent="0" defTabSz="685748" eaLnBrk="1" fontAlgn="auto" latinLnBrk="0" hangingPunct="1">
+                  <a:lnSpc>
+                    <a:spcPct val="100000"/>
+                  </a:lnSpc>
+                  <a:spcBef>
+                    <a:spcPts val="0"/>
+                  </a:spcBef>
+                  <a:spcAft>
+                    <a:spcPts val="0"/>
+                  </a:spcAft>
+                  <a:buClrTx/>
+                  <a:buSzTx/>
+                  <a:buFontTx/>
+                  <a:buNone/>
+                  <a:tabLst/>
+                  <a:defRPr/>
+                </a:pPr>
+                <a:endParaRPr kumimoji="0" lang="en-US" sz="1050" b="1" i="0" u="none" strike="noStrike" kern="0" cap="none" spc="0" normalizeH="0" baseline="0" noProof="0">
+                  <a:ln>
+                    <a:noFill/>
+                  </a:ln>
+                  <a:solidFill>
+                    <a:srgbClr val="474749">
+                      <a:lumMod val="95000"/>
+                      <a:lumOff val="5000"/>
+                    </a:srgbClr>
+                  </a:solidFill>
+                  <a:effectLst/>
+                  <a:uLnTx/>
+                  <a:uFillTx/>
+                  <a:latin typeface="Arial" panose="020B0604020202020204"/>
+                </a:endParaRPr>
+              </a:p>
+            </p:txBody>
+          </p:sp>
+          <p:sp>
+            <p:nvSpPr>
+              <p:cNvPr id="52" name="Alternate Process 59">
+                <a:extLst>
+                  <a:ext uri="{FF2B5EF4-FFF2-40B4-BE49-F238E27FC236}">
+                    <a16:creationId xmlns:a16="http://schemas.microsoft.com/office/drawing/2014/main" id="{7E678160-9F90-E89D-D513-3FC1E941121D}"/>
+                  </a:ext>
+                </a:extLst>
+              </p:cNvPr>
+              <p:cNvSpPr/>
+              <p:nvPr/>
+            </p:nvSpPr>
+            <p:spPr>
+              <a:xfrm>
+                <a:off x="1199856" y="2041004"/>
+                <a:ext cx="2473277" cy="1940681"/>
+              </a:xfrm>
+              <a:prstGeom prst="roundRect">
+                <a:avLst>
+                  <a:gd name="adj" fmla="val 14005"/>
+                </a:avLst>
+              </a:prstGeom>
+              <a:solidFill>
+                <a:srgbClr val="D6843C"/>
+              </a:solidFill>
+              <a:ln w="28575" cap="flat" cmpd="sng" algn="ctr">
+                <a:solidFill>
+                  <a:srgbClr val="D6843C">
+                    <a:lumMod val="75000"/>
+                  </a:srgbClr>
+                </a:solidFill>
+                <a:prstDash val="solid"/>
+                <a:miter lim="800000"/>
+              </a:ln>
+              <a:effectLst/>
+            </p:spPr>
+            <p:txBody>
+              <a:bodyPr lIns="0" rIns="0" rtlCol="0" anchor="ctr" anchorCtr="0"/>
+              <a:lstStyle/>
+              <a:p>
+                <a:pPr marL="0" marR="0" lvl="0" indent="0" algn="ctr" defTabSz="685748" eaLnBrk="1" fontAlgn="auto" latinLnBrk="0" hangingPunct="1">
+                  <a:lnSpc>
+                    <a:spcPct val="100000"/>
+                  </a:lnSpc>
+                  <a:spcBef>
+                    <a:spcPts val="0"/>
+                  </a:spcBef>
+                  <a:spcAft>
+                    <a:spcPts val="0"/>
+                  </a:spcAft>
+                  <a:buClrTx/>
+                  <a:buSzTx/>
+                  <a:buFontTx/>
+                  <a:buNone/>
+                  <a:tabLst/>
+                  <a:defRPr/>
+                </a:pPr>
+                <a:r>
+                  <a:rPr kumimoji="0" lang="en-US" sz="1050" b="1" i="0" u="none" strike="noStrike" kern="0" cap="none" spc="0" normalizeH="0" baseline="0" noProof="0" dirty="0">
+                    <a:ln>
+                      <a:noFill/>
+                    </a:ln>
+                    <a:solidFill>
+                      <a:prstClr val="white"/>
+                    </a:solidFill>
+                    <a:effectLst/>
+                    <a:uLnTx/>
+                    <a:uFillTx/>
+                    <a:latin typeface="Arial" panose="020B0604020202020204"/>
+                  </a:rPr>
+                  <a:t>Advanced Explanation of Benefit (AEOB)</a:t>
+                </a:r>
+                <a:br>
+                  <a:rPr kumimoji="0" lang="en-US" sz="1050" b="1" i="0" u="none" strike="noStrike" kern="0" cap="none" spc="0" normalizeH="0" baseline="0" noProof="0" dirty="0">
+                    <a:ln>
+                      <a:noFill/>
+                    </a:ln>
+                    <a:solidFill>
+                      <a:prstClr val="white"/>
+                    </a:solidFill>
+                    <a:effectLst/>
+                    <a:uLnTx/>
+                    <a:uFillTx/>
+                    <a:latin typeface="Arial" panose="020B0604020202020204"/>
+                  </a:rPr>
+                </a:br>
+                <a:r>
+                  <a:rPr kumimoji="0" lang="en-US" sz="788" b="1" i="0" u="none" strike="noStrike" kern="0" cap="none" spc="0" normalizeH="0" baseline="0" noProof="0" dirty="0" err="1">
+                    <a:ln>
+                      <a:noFill/>
+                    </a:ln>
+                    <a:solidFill>
+                      <a:prstClr val="white"/>
+                    </a:solidFill>
+                    <a:effectLst/>
+                    <a:uLnTx/>
+                    <a:uFillTx/>
+                    <a:latin typeface="Arial" panose="020B0604020202020204"/>
+                  </a:rPr>
+                  <a:t>ExplanationOfBenefit</a:t>
+                </a:r>
+                <a:r>
+                  <a:rPr kumimoji="0" lang="en-US" sz="788" b="1" i="0" u="none" strike="noStrike" kern="0" cap="none" spc="0" normalizeH="0" baseline="0" noProof="0" dirty="0">
+                    <a:ln>
+                      <a:noFill/>
+                    </a:ln>
+                    <a:solidFill>
+                      <a:prstClr val="white"/>
+                    </a:solidFill>
+                    <a:effectLst/>
+                    <a:uLnTx/>
+                    <a:uFillTx/>
+                    <a:latin typeface="Arial" panose="020B0604020202020204"/>
+                  </a:rPr>
+                  <a:t> Resource</a:t>
+                </a:r>
+                <a:endParaRPr kumimoji="0" lang="en-US" sz="1050" b="1" i="0" u="none" strike="noStrike" kern="0" cap="none" spc="0" normalizeH="0" baseline="0" noProof="0" dirty="0">
+                  <a:ln>
+                    <a:noFill/>
+                  </a:ln>
+                  <a:solidFill>
+                    <a:prstClr val="white"/>
+                  </a:solidFill>
+                  <a:effectLst/>
+                  <a:uLnTx/>
+                  <a:uFillTx/>
+                  <a:latin typeface="Arial" panose="020B0604020202020204"/>
+                </a:endParaRPr>
+              </a:p>
+              <a:p>
+                <a:pPr marL="137160" marR="0" lvl="0" indent="-137160" defTabSz="685748" eaLnBrk="1" fontAlgn="auto" latinLnBrk="0" hangingPunct="1">
+                  <a:lnSpc>
+                    <a:spcPct val="100000"/>
+                  </a:lnSpc>
+                  <a:spcBef>
+                    <a:spcPts val="450"/>
+                  </a:spcBef>
+                  <a:spcAft>
+                    <a:spcPts val="0"/>
+                  </a:spcAft>
+                  <a:buClrTx/>
+                  <a:buSzTx/>
+                  <a:buFont typeface="Arial" panose="020B0604020202020204" pitchFamily="34" charset="0"/>
+                  <a:buChar char="•"/>
+                  <a:tabLst/>
+                  <a:defRPr/>
+                </a:pPr>
+                <a:r>
+                  <a:rPr kumimoji="0" lang="en-US" sz="1050" b="1" i="0" u="none" strike="noStrike" kern="0" cap="none" spc="0" normalizeH="0" baseline="0" noProof="0" dirty="0">
+                    <a:ln>
+                      <a:noFill/>
+                    </a:ln>
+                    <a:solidFill>
+                      <a:prstClr val="white"/>
+                    </a:solidFill>
+                    <a:effectLst/>
+                    <a:uLnTx/>
+                    <a:uFillTx/>
+                    <a:latin typeface="Arial" panose="020B0604020202020204"/>
+                  </a:rPr>
+                  <a:t>GFE reference</a:t>
+                </a:r>
+              </a:p>
+              <a:p>
+                <a:pPr marL="137160" marR="0" lvl="0" indent="-137160" defTabSz="685748" eaLnBrk="1" fontAlgn="auto" latinLnBrk="0" hangingPunct="1">
+                  <a:lnSpc>
+                    <a:spcPct val="100000"/>
+                  </a:lnSpc>
+                  <a:spcBef>
+                    <a:spcPts val="0"/>
+                  </a:spcBef>
+                  <a:spcAft>
+                    <a:spcPts val="0"/>
+                  </a:spcAft>
+                  <a:buClrTx/>
+                  <a:buSzTx/>
+                  <a:buFont typeface="Arial" panose="020B0604020202020204" pitchFamily="34" charset="0"/>
+                  <a:buChar char="•"/>
+                  <a:tabLst/>
+                  <a:defRPr/>
+                </a:pPr>
+                <a:r>
+                  <a:rPr kumimoji="0" lang="en-US" sz="1050" b="1" i="0" u="none" strike="noStrike" kern="0" cap="none" spc="0" normalizeH="0" baseline="0" noProof="0" dirty="0">
+                    <a:ln>
+                      <a:noFill/>
+                    </a:ln>
+                    <a:solidFill>
+                      <a:prstClr val="white"/>
+                    </a:solidFill>
+                    <a:effectLst/>
+                    <a:uLnTx/>
+                    <a:uFillTx/>
+                    <a:latin typeface="Arial" panose="020B0604020202020204"/>
+                  </a:rPr>
+                  <a:t>Line items</a:t>
+                </a:r>
+              </a:p>
+              <a:p>
+                <a:pPr marL="411480" marR="0" lvl="1" indent="-137160" defTabSz="685748" eaLnBrk="1" fontAlgn="auto" latinLnBrk="0" hangingPunct="1">
+                  <a:lnSpc>
+                    <a:spcPct val="100000"/>
+                  </a:lnSpc>
+                  <a:spcBef>
+                    <a:spcPts val="225"/>
+                  </a:spcBef>
+                  <a:spcAft>
+                    <a:spcPts val="0"/>
+                  </a:spcAft>
+                  <a:buClrTx/>
+                  <a:buSzTx/>
+                  <a:buFont typeface="Arial" panose="020B0604020202020204" pitchFamily="34" charset="0"/>
+                  <a:buChar char="•"/>
+                  <a:tabLst/>
+                  <a:defRPr/>
+                </a:pPr>
+                <a:r>
+                  <a:rPr kumimoji="0" lang="en-US" sz="900" b="1" i="0" u="none" strike="noStrike" kern="0" cap="none" spc="0" normalizeH="0" baseline="0" noProof="0" dirty="0">
+                    <a:ln>
+                      <a:noFill/>
+                    </a:ln>
+                    <a:solidFill>
+                      <a:prstClr val="white"/>
+                    </a:solidFill>
+                    <a:effectLst/>
+                    <a:uLnTx/>
+                    <a:uFillTx/>
+                    <a:latin typeface="Arial" panose="020B0604020202020204"/>
+                  </a:rPr>
+                  <a:t>Product/Service</a:t>
+                </a:r>
+              </a:p>
+              <a:p>
+                <a:pPr marL="411480" marR="0" lvl="1" indent="-137160" defTabSz="685748" eaLnBrk="1" fontAlgn="auto" latinLnBrk="0" hangingPunct="1">
+                  <a:lnSpc>
+                    <a:spcPct val="100000"/>
+                  </a:lnSpc>
+                  <a:spcBef>
+                    <a:spcPts val="225"/>
+                  </a:spcBef>
+                  <a:spcAft>
+                    <a:spcPts val="0"/>
+                  </a:spcAft>
+                  <a:buClrTx/>
+                  <a:buSzTx/>
+                  <a:buFont typeface="Arial" panose="020B0604020202020204" pitchFamily="34" charset="0"/>
+                  <a:buChar char="•"/>
+                  <a:tabLst/>
+                  <a:defRPr/>
+                </a:pPr>
+                <a:r>
+                  <a:rPr kumimoji="0" lang="en-US" sz="900" b="1" i="0" u="none" strike="noStrike" kern="0" cap="none" spc="0" normalizeH="0" baseline="0" noProof="0" dirty="0">
+                    <a:ln>
+                      <a:noFill/>
+                    </a:ln>
+                    <a:solidFill>
+                      <a:prstClr val="white"/>
+                    </a:solidFill>
+                    <a:effectLst/>
+                    <a:uLnTx/>
+                    <a:uFillTx/>
+                    <a:latin typeface="Arial" panose="020B0604020202020204"/>
+                  </a:rPr>
+                  <a:t>Adjudication amounts</a:t>
+                </a:r>
+              </a:p>
+              <a:p>
+                <a:pPr marL="411480" marR="0" lvl="1" indent="-137160" defTabSz="685748" eaLnBrk="1" fontAlgn="auto" latinLnBrk="0" hangingPunct="1">
+                  <a:lnSpc>
+                    <a:spcPct val="100000"/>
+                  </a:lnSpc>
+                  <a:spcBef>
+                    <a:spcPts val="225"/>
+                  </a:spcBef>
+                  <a:spcAft>
+                    <a:spcPts val="0"/>
+                  </a:spcAft>
+                  <a:buClrTx/>
+                  <a:buSzTx/>
+                  <a:buFont typeface="Arial" panose="020B0604020202020204" pitchFamily="34" charset="0"/>
+                  <a:buChar char="•"/>
+                  <a:tabLst/>
+                  <a:defRPr/>
+                </a:pPr>
+                <a:r>
+                  <a:rPr kumimoji="0" lang="en-US" sz="900" b="1" i="0" u="none" strike="noStrike" kern="0" cap="none" spc="0" normalizeH="0" baseline="0" noProof="0" dirty="0">
+                    <a:ln>
+                      <a:noFill/>
+                    </a:ln>
+                    <a:solidFill>
+                      <a:prstClr val="white"/>
+                    </a:solidFill>
+                    <a:effectLst/>
+                    <a:uLnTx/>
+                    <a:uFillTx/>
+                    <a:latin typeface="Arial" panose="020B0604020202020204"/>
+                  </a:rPr>
+                  <a:t>Medical </a:t>
+                </a:r>
+                <a:r>
+                  <a:rPr kumimoji="0" lang="en-US" sz="900" b="1" i="0" u="none" strike="noStrike" kern="0" cap="none" spc="0" normalizeH="0" baseline="0" noProof="0" dirty="0" err="1">
+                    <a:ln>
+                      <a:noFill/>
+                    </a:ln>
+                    <a:solidFill>
+                      <a:prstClr val="white"/>
+                    </a:solidFill>
+                    <a:effectLst/>
+                    <a:uLnTx/>
+                    <a:uFillTx/>
+                    <a:latin typeface="Arial" panose="020B0604020202020204"/>
+                  </a:rPr>
+                  <a:t>Mgmt</a:t>
+                </a:r>
+                <a:r>
+                  <a:rPr kumimoji="0" lang="en-US" sz="900" b="1" i="0" u="none" strike="noStrike" kern="0" cap="none" spc="0" normalizeH="0" baseline="0" noProof="0" dirty="0">
+                    <a:ln>
+                      <a:noFill/>
+                    </a:ln>
+                    <a:solidFill>
+                      <a:prstClr val="white"/>
+                    </a:solidFill>
+                    <a:effectLst/>
+                    <a:uLnTx/>
+                    <a:uFillTx/>
+                    <a:latin typeface="Arial" panose="020B0604020202020204"/>
+                  </a:rPr>
+                  <a:t> </a:t>
+                </a:r>
+                <a:r>
+                  <a:rPr kumimoji="0" lang="en-US" sz="900" b="1" i="0" u="none" strike="noStrike" kern="0" cap="none" spc="0" normalizeH="0" baseline="0" noProof="0" dirty="0" err="1">
+                    <a:ln>
+                      <a:noFill/>
+                    </a:ln>
+                    <a:solidFill>
+                      <a:prstClr val="white"/>
+                    </a:solidFill>
+                    <a:effectLst/>
+                    <a:uLnTx/>
+                    <a:uFillTx/>
+                    <a:latin typeface="Arial" panose="020B0604020202020204"/>
+                  </a:rPr>
+                  <a:t>Reqs</a:t>
+                </a:r>
+                <a:r>
+                  <a:rPr kumimoji="0" lang="en-US" sz="900" b="1" i="0" u="none" strike="noStrike" kern="0" cap="none" spc="0" normalizeH="0" baseline="0" noProof="0" dirty="0">
+                    <a:ln>
+                      <a:noFill/>
+                    </a:ln>
+                    <a:solidFill>
+                      <a:prstClr val="white"/>
+                    </a:solidFill>
+                    <a:effectLst/>
+                    <a:uLnTx/>
+                    <a:uFillTx/>
+                    <a:latin typeface="Arial" panose="020B0604020202020204"/>
+                  </a:rPr>
+                  <a:t>.</a:t>
+                </a:r>
+              </a:p>
+              <a:p>
+                <a:pPr marL="137160" marR="0" lvl="0" indent="-137160" defTabSz="685748" eaLnBrk="1" fontAlgn="auto" latinLnBrk="0" hangingPunct="1">
+                  <a:lnSpc>
+                    <a:spcPct val="100000"/>
+                  </a:lnSpc>
+                  <a:spcBef>
+                    <a:spcPts val="225"/>
+                  </a:spcBef>
+                  <a:spcAft>
+                    <a:spcPts val="0"/>
+                  </a:spcAft>
+                  <a:buClrTx/>
+                  <a:buSzTx/>
+                  <a:buFont typeface="Arial" panose="020B0604020202020204" pitchFamily="34" charset="0"/>
+                  <a:buChar char="•"/>
+                  <a:tabLst/>
+                  <a:defRPr/>
+                </a:pPr>
+                <a:r>
+                  <a:rPr kumimoji="0" lang="en-US" sz="1050" b="1" i="0" u="none" strike="noStrike" kern="0" cap="none" spc="0" normalizeH="0" baseline="0" noProof="0" dirty="0">
+                    <a:ln>
+                      <a:noFill/>
+                    </a:ln>
+                    <a:solidFill>
+                      <a:prstClr val="white"/>
+                    </a:solidFill>
+                    <a:effectLst/>
+                    <a:uLnTx/>
+                    <a:uFillTx/>
+                    <a:latin typeface="Arial" panose="020B0604020202020204"/>
+                  </a:rPr>
+                  <a:t>Totals</a:t>
+                </a:r>
+              </a:p>
+            </p:txBody>
+          </p:sp>
+          <p:sp>
+            <p:nvSpPr>
+              <p:cNvPr id="53" name="Alternate Process 60">
+                <a:extLst>
+                  <a:ext uri="{FF2B5EF4-FFF2-40B4-BE49-F238E27FC236}">
+                    <a16:creationId xmlns:a16="http://schemas.microsoft.com/office/drawing/2014/main" id="{BE89DC54-A71E-DEF1-C9CC-D44C5A549CEC}"/>
+                  </a:ext>
+                </a:extLst>
+              </p:cNvPr>
+              <p:cNvSpPr/>
+              <p:nvPr/>
+            </p:nvSpPr>
+            <p:spPr>
+              <a:xfrm>
+                <a:off x="3779380" y="2110062"/>
+                <a:ext cx="1477904" cy="538262"/>
+              </a:xfrm>
+              <a:prstGeom prst="roundRect">
+                <a:avLst/>
+              </a:prstGeom>
+              <a:solidFill>
+                <a:srgbClr val="A91F24"/>
+              </a:solidFill>
+              <a:ln w="28575" cap="flat" cmpd="sng" algn="ctr">
+                <a:solidFill>
+                  <a:srgbClr val="A91F24">
+                    <a:lumMod val="75000"/>
+                  </a:srgbClr>
+                </a:solidFill>
+                <a:prstDash val="solid"/>
+                <a:miter lim="800000"/>
+              </a:ln>
+              <a:effectLst/>
+            </p:spPr>
+            <p:txBody>
+              <a:bodyPr lIns="0" rIns="0" rtlCol="0" anchor="ctr"/>
+              <a:lstStyle/>
+              <a:p>
+                <a:pPr marL="0" marR="0" lvl="0" indent="0" algn="ctr" defTabSz="685748" eaLnBrk="1" fontAlgn="auto" latinLnBrk="0" hangingPunct="1">
+                  <a:lnSpc>
+                    <a:spcPct val="100000"/>
+                  </a:lnSpc>
+                  <a:spcBef>
+                    <a:spcPts val="0"/>
+                  </a:spcBef>
+                  <a:spcAft>
+                    <a:spcPts val="0"/>
+                  </a:spcAft>
+                  <a:buClrTx/>
+                  <a:buSzTx/>
+                  <a:buFontTx/>
+                  <a:buNone/>
+                  <a:tabLst/>
+                  <a:defRPr/>
+                </a:pPr>
+                <a:r>
+                  <a:rPr kumimoji="0" lang="en-US" sz="1050" b="1" i="0" u="none" strike="noStrike" kern="0" cap="none" spc="0" normalizeH="0" baseline="0" noProof="0" dirty="0">
+                    <a:ln>
+                      <a:noFill/>
+                    </a:ln>
+                    <a:solidFill>
+                      <a:prstClr val="white"/>
+                    </a:solidFill>
+                    <a:effectLst/>
+                    <a:uLnTx/>
+                    <a:uFillTx/>
+                    <a:latin typeface="Arial" panose="020B0604020202020204"/>
+                  </a:rPr>
+                  <a:t>PCT Organization </a:t>
+                </a:r>
+                <a:r>
+                  <a:rPr kumimoji="0" lang="en-US" sz="1050" b="1" i="1" u="none" strike="noStrike" kern="0" cap="none" spc="0" normalizeH="0" baseline="0" noProof="0" dirty="0">
+                    <a:ln>
+                      <a:noFill/>
+                    </a:ln>
+                    <a:solidFill>
+                      <a:prstClr val="white"/>
+                    </a:solidFill>
+                    <a:effectLst/>
+                    <a:uLnTx/>
+                    <a:uFillTx/>
+                    <a:latin typeface="Arial" panose="020B0604020202020204"/>
+                  </a:rPr>
+                  <a:t>(Provider)</a:t>
+                </a:r>
+              </a:p>
+            </p:txBody>
+          </p:sp>
+          <p:sp>
+            <p:nvSpPr>
+              <p:cNvPr id="54" name="Alternate Process 61">
+                <a:extLst>
+                  <a:ext uri="{FF2B5EF4-FFF2-40B4-BE49-F238E27FC236}">
+                    <a16:creationId xmlns:a16="http://schemas.microsoft.com/office/drawing/2014/main" id="{000203F7-1BF5-DD86-1329-70D7AECCFDC4}"/>
+                  </a:ext>
+                </a:extLst>
+              </p:cNvPr>
+              <p:cNvSpPr/>
+              <p:nvPr/>
+            </p:nvSpPr>
+            <p:spPr>
+              <a:xfrm>
+                <a:off x="3779380" y="2734399"/>
+                <a:ext cx="1476834" cy="431075"/>
+              </a:xfrm>
+              <a:prstGeom prst="roundRect">
+                <a:avLst/>
+              </a:prstGeom>
+              <a:solidFill>
+                <a:srgbClr val="A91F24"/>
+              </a:solidFill>
+              <a:ln w="28575" cap="flat" cmpd="sng" algn="ctr">
+                <a:solidFill>
+                  <a:srgbClr val="A91F24">
+                    <a:lumMod val="75000"/>
+                  </a:srgbClr>
+                </a:solidFill>
+                <a:prstDash val="solid"/>
+                <a:miter lim="800000"/>
+              </a:ln>
+              <a:effectLst/>
+            </p:spPr>
+            <p:txBody>
+              <a:bodyPr rtlCol="0" anchor="ctr"/>
+              <a:lstStyle/>
+              <a:p>
+                <a:pPr marL="0" marR="0" lvl="0" indent="0" algn="ctr" defTabSz="685748" eaLnBrk="1" fontAlgn="auto" latinLnBrk="0" hangingPunct="1">
+                  <a:lnSpc>
+                    <a:spcPct val="100000"/>
+                  </a:lnSpc>
+                  <a:spcBef>
+                    <a:spcPts val="0"/>
+                  </a:spcBef>
+                  <a:spcAft>
+                    <a:spcPts val="0"/>
+                  </a:spcAft>
+                  <a:buClrTx/>
+                  <a:buSzTx/>
+                  <a:buFontTx/>
+                  <a:buNone/>
+                  <a:tabLst/>
+                  <a:defRPr/>
+                </a:pPr>
+                <a:r>
+                  <a:rPr kumimoji="0" lang="en-US" sz="1050" b="1" i="0" u="none" strike="noStrike" kern="0" cap="none" spc="0" normalizeH="0" baseline="0" noProof="0">
+                    <a:ln>
+                      <a:noFill/>
+                    </a:ln>
+                    <a:solidFill>
+                      <a:prstClr val="white"/>
+                    </a:solidFill>
+                    <a:effectLst/>
+                    <a:uLnTx/>
+                    <a:uFillTx/>
+                    <a:latin typeface="Arial" panose="020B0604020202020204"/>
+                  </a:rPr>
+                  <a:t>PCT Practitioner</a:t>
+                </a:r>
+              </a:p>
+            </p:txBody>
+          </p:sp>
+        </p:grpSp>
+      </p:grpSp>
     </p:spTree>
     <p:extLst>
       <p:ext uri="{BB962C8B-B14F-4D97-AF65-F5344CB8AC3E}">

</xml_diff>